<commit_message>
Wrote notes for Lecture 5, recut PowerPoints
My PowerPoint slides for the topics grouped into "Lecture 4" and "Lecture 5" did not actually match that grouping, and needed to be split across the folders in order to line up with their topics. The readme.md and PPTX files in 040_operators and 050_reading_and_displaying are now more synchronized.
</commit_message>
<xml_diff>
--- a/lectures/030_datatypes_and_variables/Datatypes-Variables.pptx
+++ b/lectures/030_datatypes_and_variables/Datatypes-Variables.pptx
@@ -5,29 +5,28 @@
     <p:sldMasterId id="2147483732" r:id="rId1"/>
   </p:sldMasterIdLst>
   <p:notesMasterIdLst>
-    <p:notesMasterId r:id="rId19"/>
+    <p:notesMasterId r:id="rId18"/>
   </p:notesMasterIdLst>
   <p:handoutMasterIdLst>
-    <p:handoutMasterId r:id="rId20"/>
+    <p:handoutMasterId r:id="rId19"/>
   </p:handoutMasterIdLst>
   <p:sldIdLst>
     <p:sldId id="256" r:id="rId2"/>
-    <p:sldId id="307" r:id="rId3"/>
-    <p:sldId id="279" r:id="rId4"/>
-    <p:sldId id="312" r:id="rId5"/>
-    <p:sldId id="308" r:id="rId6"/>
-    <p:sldId id="309" r:id="rId7"/>
-    <p:sldId id="310" r:id="rId8"/>
-    <p:sldId id="311" r:id="rId9"/>
-    <p:sldId id="313" r:id="rId10"/>
-    <p:sldId id="315" r:id="rId11"/>
-    <p:sldId id="314" r:id="rId12"/>
-    <p:sldId id="316" r:id="rId13"/>
-    <p:sldId id="317" r:id="rId14"/>
-    <p:sldId id="318" r:id="rId15"/>
-    <p:sldId id="319" r:id="rId16"/>
-    <p:sldId id="320" r:id="rId17"/>
-    <p:sldId id="321" r:id="rId18"/>
+    <p:sldId id="279" r:id="rId3"/>
+    <p:sldId id="312" r:id="rId4"/>
+    <p:sldId id="308" r:id="rId5"/>
+    <p:sldId id="309" r:id="rId6"/>
+    <p:sldId id="310" r:id="rId7"/>
+    <p:sldId id="311" r:id="rId8"/>
+    <p:sldId id="313" r:id="rId9"/>
+    <p:sldId id="315" r:id="rId10"/>
+    <p:sldId id="314" r:id="rId11"/>
+    <p:sldId id="316" r:id="rId12"/>
+    <p:sldId id="317" r:id="rId13"/>
+    <p:sldId id="318" r:id="rId14"/>
+    <p:sldId id="319" r:id="rId15"/>
+    <p:sldId id="320" r:id="rId16"/>
+    <p:sldId id="321" r:id="rId17"/>
   </p:sldIdLst>
   <p:sldSz cx="12188825" cy="6858000"/>
   <p:notesSz cx="6858000" cy="9144000"/>
@@ -1589,7 +1588,7 @@
           <a:p>
             <a:fld id="{2507D560-C4D4-4804-8CBF-2C56AB6C6DB9}" type="datetimeFigureOut">
               <a:rPr lang="en-US" smtClean="0"/>
-              <a:t>2/15/2021</a:t>
+              <a:t>5/25/2021</a:t>
             </a:fld>
             <a:endParaRPr lang="en-US"/>
           </a:p>
@@ -1754,7 +1753,7 @@
           <a:p>
             <a:fld id="{688E7586-9A7B-41FF-B169-85DADA744493}" type="datetimeFigureOut">
               <a:rPr lang="en-US" smtClean="0"/>
-              <a:t>2/15/2021</a:t>
+              <a:t>5/25/2021</a:t>
             </a:fld>
             <a:endParaRPr lang="en-US"/>
           </a:p>
@@ -2086,7 +2085,7 @@
           <a:p>
             <a:fld id="{A1C84708-EF86-4919-A70B-6AFA04E8487E}" type="slidenum">
               <a:rPr lang="en-US" smtClean="0"/>
-              <a:t>9</a:t>
+              <a:t>8</a:t>
             </a:fld>
             <a:endParaRPr lang="en-US"/>
           </a:p>
@@ -5463,8 +5462,13 @@
           <a:p>
             <a:r>
               <a:rPr lang="en-US" dirty="0"/>
-              <a:t>Spring 2021</a:t>
-            </a:r>
+              <a:t>Spring </a:t>
+            </a:r>
+            <a:r>
+              <a:rPr lang="en-US" dirty="0" smtClean="0"/>
+              <a:t>20XX</a:t>
+            </a:r>
+            <a:endParaRPr lang="en-US" dirty="0"/>
           </a:p>
         </p:txBody>
       </p:sp>
@@ -5512,137 +5516,6 @@
 </file>
 
 <file path=ppt/slides/slide10.xml><?xml version="1.0" encoding="utf-8"?>
-<p:sld xmlns:a="http://schemas.openxmlformats.org/drawingml/2006/main" xmlns:r="http://schemas.openxmlformats.org/officeDocument/2006/relationships" xmlns:p="http://schemas.openxmlformats.org/presentationml/2006/main">
-  <p:cSld>
-    <p:spTree>
-      <p:nvGrpSpPr>
-        <p:cNvPr id="1" name=""/>
-        <p:cNvGrpSpPr/>
-        <p:nvPr/>
-      </p:nvGrpSpPr>
-      <p:grpSpPr>
-        <a:xfrm>
-          <a:off x="0" y="0"/>
-          <a:ext cx="0" cy="0"/>
-          <a:chOff x="0" y="0"/>
-          <a:chExt cx="0" cy="0"/>
-        </a:xfrm>
-      </p:grpSpPr>
-      <p:sp>
-        <p:nvSpPr>
-          <p:cNvPr id="6" name="Title 5"/>
-          <p:cNvSpPr>
-            <a:spLocks noGrp="1"/>
-          </p:cNvSpPr>
-          <p:nvPr>
-            <p:ph type="title"/>
-          </p:nvPr>
-        </p:nvSpPr>
-        <p:spPr/>
-        <p:txBody>
-          <a:bodyPr/>
-          <a:lstStyle/>
-          <a:p>
-            <a:r>
-              <a:rPr lang="en-US" dirty="0"/>
-              <a:t>Outline</a:t>
-            </a:r>
-          </a:p>
-        </p:txBody>
-      </p:sp>
-      <p:sp>
-        <p:nvSpPr>
-          <p:cNvPr id="7" name="Content Placeholder 6"/>
-          <p:cNvSpPr>
-            <a:spLocks noGrp="1"/>
-          </p:cNvSpPr>
-          <p:nvPr>
-            <p:ph idx="1"/>
-          </p:nvPr>
-        </p:nvSpPr>
-        <p:spPr/>
-        <p:txBody>
-          <a:bodyPr>
-            <a:normAutofit/>
-          </a:bodyPr>
-          <a:lstStyle/>
-          <a:p>
-            <a:r>
-              <a:rPr lang="en-US" dirty="0"/>
-              <a:t>Basic C# Datatypes</a:t>
-            </a:r>
-          </a:p>
-          <a:p>
-            <a:r>
-              <a:rPr lang="en-US" dirty="0"/>
-              <a:t>Literals and Variables</a:t>
-            </a:r>
-          </a:p>
-          <a:p>
-            <a:r>
-              <a:rPr lang="en-US" b="1" dirty="0"/>
-              <a:t>Basic Variable Operations</a:t>
-            </a:r>
-          </a:p>
-          <a:p>
-            <a:pPr lvl="1"/>
-            <a:r>
-              <a:rPr lang="en-US" dirty="0"/>
-              <a:t>Declaration</a:t>
-            </a:r>
-          </a:p>
-          <a:p>
-            <a:pPr lvl="1"/>
-            <a:r>
-              <a:rPr lang="en-US" dirty="0"/>
-              <a:t>Assignment</a:t>
-            </a:r>
-          </a:p>
-          <a:p>
-            <a:pPr lvl="1"/>
-            <a:r>
-              <a:rPr lang="en-US" dirty="0"/>
-              <a:t>Displaying</a:t>
-            </a:r>
-          </a:p>
-        </p:txBody>
-      </p:sp>
-      <p:sp>
-        <p:nvSpPr>
-          <p:cNvPr id="4" name="Footer Placeholder 3"/>
-          <p:cNvSpPr>
-            <a:spLocks noGrp="1"/>
-          </p:cNvSpPr>
-          <p:nvPr>
-            <p:ph type="ftr" sz="quarter" idx="11"/>
-          </p:nvPr>
-        </p:nvSpPr>
-        <p:spPr/>
-        <p:txBody>
-          <a:bodyPr/>
-          <a:lstStyle/>
-          <a:p>
-            <a:r>
-              <a:rPr lang="en-US" dirty="0"/>
-              <a:t>CSCI 1301</a:t>
-            </a:r>
-          </a:p>
-        </p:txBody>
-      </p:sp>
-    </p:spTree>
-    <p:extLst>
-      <p:ext uri="{BB962C8B-B14F-4D97-AF65-F5344CB8AC3E}">
-        <p14:creationId xmlns:p14="http://schemas.microsoft.com/office/powerpoint/2010/main" val="2577889060"/>
-      </p:ext>
-    </p:extLst>
-  </p:cSld>
-  <p:clrMapOvr>
-    <a:masterClrMapping/>
-  </p:clrMapOvr>
-</p:sld>
-</file>
-
-<file path=ppt/slides/slide11.xml><?xml version="1.0" encoding="utf-8"?>
 <p:sld xmlns:a="http://schemas.openxmlformats.org/drawingml/2006/main" xmlns:r="http://schemas.openxmlformats.org/officeDocument/2006/relationships" xmlns:p="http://schemas.openxmlformats.org/presentationml/2006/main">
   <p:cSld>
     <p:spTree>
@@ -6671,7 +6544,7 @@
 </p:sld>
 </file>
 
-<file path=ppt/slides/slide12.xml><?xml version="1.0" encoding="utf-8"?>
+<file path=ppt/slides/slide11.xml><?xml version="1.0" encoding="utf-8"?>
 <p:sld xmlns:a="http://schemas.openxmlformats.org/drawingml/2006/main" xmlns:r="http://schemas.openxmlformats.org/officeDocument/2006/relationships" xmlns:p="http://schemas.openxmlformats.org/presentationml/2006/main">
   <p:cSld>
     <p:spTree>
@@ -7525,7 +7398,7 @@
 </p:sld>
 </file>
 
-<file path=ppt/slides/slide13.xml><?xml version="1.0" encoding="utf-8"?>
+<file path=ppt/slides/slide12.xml><?xml version="1.0" encoding="utf-8"?>
 <p:sld xmlns:a="http://schemas.openxmlformats.org/drawingml/2006/main" xmlns:r="http://schemas.openxmlformats.org/officeDocument/2006/relationships" xmlns:p="http://schemas.openxmlformats.org/presentationml/2006/main">
   <p:cSld>
     <p:spTree>
@@ -8449,7 +8322,7 @@
 </p:sld>
 </file>
 
-<file path=ppt/slides/slide14.xml><?xml version="1.0" encoding="utf-8"?>
+<file path=ppt/slides/slide13.xml><?xml version="1.0" encoding="utf-8"?>
 <p:sld xmlns:a="http://schemas.openxmlformats.org/drawingml/2006/main" xmlns:r="http://schemas.openxmlformats.org/officeDocument/2006/relationships" xmlns:p="http://schemas.openxmlformats.org/presentationml/2006/main">
   <p:cSld>
     <p:spTree>
@@ -9160,7 +9033,7 @@
 </p:sld>
 </file>
 
-<file path=ppt/slides/slide15.xml><?xml version="1.0" encoding="utf-8"?>
+<file path=ppt/slides/slide14.xml><?xml version="1.0" encoding="utf-8"?>
 <p:sld xmlns:a="http://schemas.openxmlformats.org/drawingml/2006/main" xmlns:r="http://schemas.openxmlformats.org/officeDocument/2006/relationships" xmlns:p="http://schemas.openxmlformats.org/presentationml/2006/main">
   <p:cSld>
     <p:spTree>
@@ -9868,7 +9741,7 @@
 </p:sld>
 </file>
 
-<file path=ppt/slides/slide16.xml><?xml version="1.0" encoding="utf-8"?>
+<file path=ppt/slides/slide15.xml><?xml version="1.0" encoding="utf-8"?>
 <p:sld xmlns:a="http://schemas.openxmlformats.org/drawingml/2006/main" xmlns:r="http://schemas.openxmlformats.org/officeDocument/2006/relationships" xmlns:p="http://schemas.openxmlformats.org/presentationml/2006/main">
   <p:cSld>
     <p:spTree>
@@ -10432,7 +10305,7 @@
 </p:sld>
 </file>
 
-<file path=ppt/slides/slide17.xml><?xml version="1.0" encoding="utf-8"?>
+<file path=ppt/slides/slide16.xml><?xml version="1.0" encoding="utf-8"?>
 <p:sld xmlns:a="http://schemas.openxmlformats.org/drawingml/2006/main" xmlns:r="http://schemas.openxmlformats.org/officeDocument/2006/relationships" xmlns:p="http://schemas.openxmlformats.org/presentationml/2006/main">
   <p:cSld>
     <p:spTree>
@@ -10582,132 +10455,6 @@
       </p:grpSpPr>
       <p:sp>
         <p:nvSpPr>
-          <p:cNvPr id="2" name="Title 1">
-            <a:extLst>
-              <a:ext uri="{FF2B5EF4-FFF2-40B4-BE49-F238E27FC236}">
-                <a16:creationId xmlns:a16="http://schemas.microsoft.com/office/drawing/2014/main" id="{9FB62947-9405-4033-8F86-87BAB797C57D}"/>
-              </a:ext>
-            </a:extLst>
-          </p:cNvPr>
-          <p:cNvSpPr>
-            <a:spLocks noGrp="1"/>
-          </p:cNvSpPr>
-          <p:nvPr>
-            <p:ph type="title"/>
-          </p:nvPr>
-        </p:nvSpPr>
-        <p:spPr/>
-        <p:txBody>
-          <a:bodyPr/>
-          <a:lstStyle/>
-          <a:p>
-            <a:r>
-              <a:rPr lang="en-US" dirty="0"/>
-              <a:t>Announcements</a:t>
-            </a:r>
-          </a:p>
-        </p:txBody>
-      </p:sp>
-      <p:sp>
-        <p:nvSpPr>
-          <p:cNvPr id="3" name="Content Placeholder 2">
-            <a:extLst>
-              <a:ext uri="{FF2B5EF4-FFF2-40B4-BE49-F238E27FC236}">
-                <a16:creationId xmlns:a16="http://schemas.microsoft.com/office/drawing/2014/main" id="{5F22BBD3-BB03-4778-A5DD-D18EA517066E}"/>
-              </a:ext>
-            </a:extLst>
-          </p:cNvPr>
-          <p:cNvSpPr>
-            <a:spLocks noGrp="1"/>
-          </p:cNvSpPr>
-          <p:nvPr>
-            <p:ph idx="1"/>
-          </p:nvPr>
-        </p:nvSpPr>
-        <p:spPr/>
-        <p:txBody>
-          <a:bodyPr/>
-          <a:lstStyle/>
-          <a:p>
-            <a:r>
-              <a:rPr lang="en-US" dirty="0"/>
-              <a:t>Quiz grades will be on D2L when finished</a:t>
-            </a:r>
-          </a:p>
-          <a:p>
-            <a:r>
-              <a:rPr lang="en-US" dirty="0"/>
-              <a:t>Homework 2 posted</a:t>
-            </a:r>
-          </a:p>
-          <a:p>
-            <a:r>
-              <a:rPr lang="en-US" dirty="0"/>
-              <a:t>No rush, but study it before the midterm</a:t>
-            </a:r>
-          </a:p>
-        </p:txBody>
-      </p:sp>
-      <p:sp>
-        <p:nvSpPr>
-          <p:cNvPr id="4" name="Footer Placeholder 3">
-            <a:extLst>
-              <a:ext uri="{FF2B5EF4-FFF2-40B4-BE49-F238E27FC236}">
-                <a16:creationId xmlns:a16="http://schemas.microsoft.com/office/drawing/2014/main" id="{EB40CA3A-792E-43D7-8C3B-8A3406A4FABE}"/>
-              </a:ext>
-            </a:extLst>
-          </p:cNvPr>
-          <p:cNvSpPr>
-            <a:spLocks noGrp="1"/>
-          </p:cNvSpPr>
-          <p:nvPr>
-            <p:ph type="ftr" sz="quarter" idx="11"/>
-          </p:nvPr>
-        </p:nvSpPr>
-        <p:spPr/>
-        <p:txBody>
-          <a:bodyPr/>
-          <a:lstStyle/>
-          <a:p>
-            <a:r>
-              <a:rPr lang="en-US"/>
-              <a:t>CSCI 1301</a:t>
-            </a:r>
-          </a:p>
-        </p:txBody>
-      </p:sp>
-    </p:spTree>
-    <p:extLst>
-      <p:ext uri="{BB962C8B-B14F-4D97-AF65-F5344CB8AC3E}">
-        <p14:creationId xmlns:p14="http://schemas.microsoft.com/office/powerpoint/2010/main" val="3269551730"/>
-      </p:ext>
-    </p:extLst>
-  </p:cSld>
-  <p:clrMapOvr>
-    <a:masterClrMapping/>
-  </p:clrMapOvr>
-</p:sld>
-</file>
-
-<file path=ppt/slides/slide3.xml><?xml version="1.0" encoding="utf-8"?>
-<p:sld xmlns:a="http://schemas.openxmlformats.org/drawingml/2006/main" xmlns:r="http://schemas.openxmlformats.org/officeDocument/2006/relationships" xmlns:p="http://schemas.openxmlformats.org/presentationml/2006/main">
-  <p:cSld>
-    <p:spTree>
-      <p:nvGrpSpPr>
-        <p:cNvPr id="1" name=""/>
-        <p:cNvGrpSpPr/>
-        <p:nvPr/>
-      </p:nvGrpSpPr>
-      <p:grpSpPr>
-        <a:xfrm>
-          <a:off x="0" y="0"/>
-          <a:ext cx="0" cy="0"/>
-          <a:chOff x="0" y="0"/>
-          <a:chExt cx="0" cy="0"/>
-        </a:xfrm>
-      </p:grpSpPr>
-      <p:sp>
-        <p:nvSpPr>
           <p:cNvPr id="6" name="Title 5"/>
           <p:cNvSpPr>
             <a:spLocks noGrp="1"/>
@@ -10820,7 +10567,7 @@
 </p:sld>
 </file>
 
-<file path=ppt/slides/slide4.xml><?xml version="1.0" encoding="utf-8"?>
+<file path=ppt/slides/slide3.xml><?xml version="1.0" encoding="utf-8"?>
 <p:sld xmlns:a="http://schemas.openxmlformats.org/drawingml/2006/main" xmlns:r="http://schemas.openxmlformats.org/officeDocument/2006/relationships" xmlns:p="http://schemas.openxmlformats.org/presentationml/2006/main">
   <p:cSld>
     <p:spTree>
@@ -11871,7 +11618,7 @@
 </p:sld>
 </file>
 
-<file path=ppt/slides/slide5.xml><?xml version="1.0" encoding="utf-8"?>
+<file path=ppt/slides/slide4.xml><?xml version="1.0" encoding="utf-8"?>
 <p:sld xmlns:a="http://schemas.openxmlformats.org/drawingml/2006/main" xmlns:r="http://schemas.openxmlformats.org/officeDocument/2006/relationships" xmlns:p="http://schemas.openxmlformats.org/presentationml/2006/main">
   <p:cSld>
     <p:spTree>
@@ -12112,6 +11859,263 @@
 </p:sld>
 </file>
 
+<file path=ppt/slides/slide5.xml><?xml version="1.0" encoding="utf-8"?>
+<p:sld xmlns:a="http://schemas.openxmlformats.org/drawingml/2006/main" xmlns:r="http://schemas.openxmlformats.org/officeDocument/2006/relationships" xmlns:p="http://schemas.openxmlformats.org/presentationml/2006/main">
+  <p:cSld>
+    <p:spTree>
+      <p:nvGrpSpPr>
+        <p:cNvPr id="1" name=""/>
+        <p:cNvGrpSpPr/>
+        <p:nvPr/>
+      </p:nvGrpSpPr>
+      <p:grpSpPr>
+        <a:xfrm>
+          <a:off x="0" y="0"/>
+          <a:ext cx="0" cy="0"/>
+          <a:chOff x="0" y="0"/>
+          <a:chExt cx="0" cy="0"/>
+        </a:xfrm>
+      </p:grpSpPr>
+      <p:sp>
+        <p:nvSpPr>
+          <p:cNvPr id="2" name="Title 1">
+            <a:extLst>
+              <a:ext uri="{FF2B5EF4-FFF2-40B4-BE49-F238E27FC236}">
+                <a16:creationId xmlns:a16="http://schemas.microsoft.com/office/drawing/2014/main" id="{DF1E60B7-20EE-4E0C-A8E8-6D0580C7D734}"/>
+              </a:ext>
+            </a:extLst>
+          </p:cNvPr>
+          <p:cNvSpPr>
+            <a:spLocks noGrp="1"/>
+          </p:cNvSpPr>
+          <p:nvPr>
+            <p:ph type="title"/>
+          </p:nvPr>
+        </p:nvSpPr>
+        <p:spPr/>
+        <p:txBody>
+          <a:bodyPr/>
+          <a:lstStyle/>
+          <a:p>
+            <a:r>
+              <a:rPr lang="en-US" dirty="0"/>
+              <a:t>Some C# Datatypes and Keywords</a:t>
+            </a:r>
+          </a:p>
+        </p:txBody>
+      </p:sp>
+      <p:sp>
+        <p:nvSpPr>
+          <p:cNvPr id="3" name="Content Placeholder 2">
+            <a:extLst>
+              <a:ext uri="{FF2B5EF4-FFF2-40B4-BE49-F238E27FC236}">
+                <a16:creationId xmlns:a16="http://schemas.microsoft.com/office/drawing/2014/main" id="{EA9C5DE6-6A68-4D41-AC26-DB04BBB53104}"/>
+              </a:ext>
+            </a:extLst>
+          </p:cNvPr>
+          <p:cNvSpPr>
+            <a:spLocks noGrp="1"/>
+          </p:cNvSpPr>
+          <p:nvPr>
+            <p:ph idx="1"/>
+          </p:nvPr>
+        </p:nvSpPr>
+        <p:spPr/>
+        <p:txBody>
+          <a:bodyPr>
+            <a:normAutofit lnSpcReduction="10000"/>
+          </a:bodyPr>
+          <a:lstStyle/>
+          <a:p>
+            <a:r>
+              <a:rPr lang="en-US" dirty="0"/>
+              <a:t>Text:</a:t>
+            </a:r>
+          </a:p>
+          <a:p>
+            <a:pPr lvl="1"/>
+            <a:r>
+              <a:rPr lang="en-US" dirty="0">
+                <a:latin typeface="Consolas" panose="020B0609020204030204" pitchFamily="49" charset="0"/>
+              </a:rPr>
+              <a:t>string </a:t>
+            </a:r>
+            <a:r>
+              <a:rPr lang="en-US" dirty="0"/>
+              <a:t>= a string, like </a:t>
+            </a:r>
+            <a:r>
+              <a:rPr lang="en-US" dirty="0">
+                <a:latin typeface="Consolas" panose="020B0609020204030204" pitchFamily="49" charset="0"/>
+              </a:rPr>
+              <a:t>"Hello World!"</a:t>
+            </a:r>
+          </a:p>
+          <a:p>
+            <a:pPr lvl="1"/>
+            <a:r>
+              <a:rPr lang="en-US" dirty="0">
+                <a:latin typeface="Consolas" panose="020B0609020204030204" pitchFamily="49" charset="0"/>
+              </a:rPr>
+              <a:t>char </a:t>
+            </a:r>
+            <a:r>
+              <a:rPr lang="en-US" dirty="0"/>
+              <a:t>= a single character, like </a:t>
+            </a:r>
+            <a:r>
+              <a:rPr lang="en-US" dirty="0">
+                <a:latin typeface="Consolas" panose="020B0609020204030204" pitchFamily="49" charset="0"/>
+              </a:rPr>
+              <a:t>'e'</a:t>
+            </a:r>
+            <a:r>
+              <a:rPr lang="en-US" dirty="0"/>
+              <a:t> or </a:t>
+            </a:r>
+            <a:r>
+              <a:rPr lang="en-US" dirty="0">
+                <a:latin typeface="Consolas" panose="020B0609020204030204" pitchFamily="49" charset="0"/>
+              </a:rPr>
+              <a:t>'\t'</a:t>
+            </a:r>
+          </a:p>
+          <a:p>
+            <a:r>
+              <a:rPr lang="en-US" dirty="0"/>
+              <a:t>Numbers:</a:t>
+            </a:r>
+          </a:p>
+          <a:p>
+            <a:pPr lvl="1"/>
+            <a:r>
+              <a:rPr lang="en-US" dirty="0">
+                <a:latin typeface="Consolas" panose="020B0609020204030204" pitchFamily="49" charset="0"/>
+              </a:rPr>
+              <a:t>int </a:t>
+            </a:r>
+            <a:r>
+              <a:rPr lang="en-US" dirty="0"/>
+              <a:t>= an integer, like -2 or 65536</a:t>
+            </a:r>
+          </a:p>
+          <a:p>
+            <a:pPr lvl="1"/>
+            <a:r>
+              <a:rPr lang="en-US" dirty="0" err="1">
+                <a:latin typeface="Consolas" panose="020B0609020204030204" pitchFamily="49" charset="0"/>
+              </a:rPr>
+              <a:t>uint</a:t>
+            </a:r>
+            <a:r>
+              <a:rPr lang="en-US" dirty="0">
+                <a:latin typeface="Consolas" panose="020B0609020204030204" pitchFamily="49" charset="0"/>
+              </a:rPr>
+              <a:t> </a:t>
+            </a:r>
+            <a:r>
+              <a:rPr lang="en-US" dirty="0"/>
+              <a:t>= an </a:t>
+            </a:r>
+            <a:r>
+              <a:rPr lang="en-US" i="1" dirty="0"/>
+              <a:t>unsigned</a:t>
+            </a:r>
+            <a:r>
+              <a:rPr lang="en-US" dirty="0"/>
+              <a:t> integer, i.e. a natural number, like 42</a:t>
+            </a:r>
+          </a:p>
+          <a:p>
+            <a:pPr lvl="1"/>
+            <a:r>
+              <a:rPr lang="en-US" dirty="0">
+                <a:latin typeface="Consolas" panose="020B0609020204030204" pitchFamily="49" charset="0"/>
+              </a:rPr>
+              <a:t>float </a:t>
+            </a:r>
+            <a:r>
+              <a:rPr lang="en-US" dirty="0"/>
+              <a:t>= a “floating-point” number, aka real number, like 3.85</a:t>
+            </a:r>
+          </a:p>
+          <a:p>
+            <a:pPr lvl="1"/>
+            <a:r>
+              <a:rPr lang="en-US" dirty="0">
+                <a:latin typeface="Consolas" panose="020B0609020204030204" pitchFamily="49" charset="0"/>
+              </a:rPr>
+              <a:t>double </a:t>
+            </a:r>
+            <a:r>
+              <a:rPr lang="en-US" dirty="0"/>
+              <a:t>= also a real number (3.85), but with “double precision”</a:t>
+            </a:r>
+          </a:p>
+          <a:p>
+            <a:pPr lvl="1"/>
+            <a:r>
+              <a:rPr lang="en-US" dirty="0">
+                <a:latin typeface="Consolas" panose="020B0609020204030204" pitchFamily="49" charset="0"/>
+              </a:rPr>
+              <a:t>decimal </a:t>
+            </a:r>
+            <a:r>
+              <a:rPr lang="en-US" dirty="0"/>
+              <a:t>= an </a:t>
+            </a:r>
+            <a:r>
+              <a:rPr lang="en-US"/>
+              <a:t>“exact decimal” </a:t>
+            </a:r>
+            <a:r>
+              <a:rPr lang="en-US" dirty="0"/>
+              <a:t>real number with 28 digits of precision</a:t>
+            </a:r>
+          </a:p>
+        </p:txBody>
+      </p:sp>
+      <p:sp>
+        <p:nvSpPr>
+          <p:cNvPr id="4" name="Footer Placeholder 3">
+            <a:extLst>
+              <a:ext uri="{FF2B5EF4-FFF2-40B4-BE49-F238E27FC236}">
+                <a16:creationId xmlns:a16="http://schemas.microsoft.com/office/drawing/2014/main" id="{3C241903-0583-4C88-9889-B105884A008B}"/>
+              </a:ext>
+            </a:extLst>
+          </p:cNvPr>
+          <p:cNvSpPr>
+            <a:spLocks noGrp="1"/>
+          </p:cNvSpPr>
+          <p:nvPr>
+            <p:ph type="ftr" sz="quarter" idx="11"/>
+          </p:nvPr>
+        </p:nvSpPr>
+        <p:spPr/>
+        <p:txBody>
+          <a:bodyPr/>
+          <a:lstStyle/>
+          <a:p>
+            <a:r>
+              <a:rPr lang="en-US"/>
+              <a:t>CSCI 1301</a:t>
+            </a:r>
+          </a:p>
+        </p:txBody>
+      </p:sp>
+    </p:spTree>
+    <p:extLst>
+      <p:ext uri="{BB962C8B-B14F-4D97-AF65-F5344CB8AC3E}">
+        <p14:creationId xmlns:p14="http://schemas.microsoft.com/office/powerpoint/2010/main" val="106207093"/>
+      </p:ext>
+    </p:extLst>
+  </p:cSld>
+  <p:clrMapOvr>
+    <a:masterClrMapping/>
+  </p:clrMapOvr>
+</p:sld>
+</file>
+
 <file path=ppt/slides/slide6.xml><?xml version="1.0" encoding="utf-8"?>
 <p:sld xmlns:a="http://schemas.openxmlformats.org/drawingml/2006/main" xmlns:r="http://schemas.openxmlformats.org/officeDocument/2006/relationships" xmlns:p="http://schemas.openxmlformats.org/presentationml/2006/main">
   <p:cSld>
@@ -12131,263 +12135,6 @@
       </p:grpSpPr>
       <p:sp>
         <p:nvSpPr>
-          <p:cNvPr id="2" name="Title 1">
-            <a:extLst>
-              <a:ext uri="{FF2B5EF4-FFF2-40B4-BE49-F238E27FC236}">
-                <a16:creationId xmlns:a16="http://schemas.microsoft.com/office/drawing/2014/main" id="{DF1E60B7-20EE-4E0C-A8E8-6D0580C7D734}"/>
-              </a:ext>
-            </a:extLst>
-          </p:cNvPr>
-          <p:cNvSpPr>
-            <a:spLocks noGrp="1"/>
-          </p:cNvSpPr>
-          <p:nvPr>
-            <p:ph type="title"/>
-          </p:nvPr>
-        </p:nvSpPr>
-        <p:spPr/>
-        <p:txBody>
-          <a:bodyPr/>
-          <a:lstStyle/>
-          <a:p>
-            <a:r>
-              <a:rPr lang="en-US" dirty="0"/>
-              <a:t>Some C# Datatypes and Keywords</a:t>
-            </a:r>
-          </a:p>
-        </p:txBody>
-      </p:sp>
-      <p:sp>
-        <p:nvSpPr>
-          <p:cNvPr id="3" name="Content Placeholder 2">
-            <a:extLst>
-              <a:ext uri="{FF2B5EF4-FFF2-40B4-BE49-F238E27FC236}">
-                <a16:creationId xmlns:a16="http://schemas.microsoft.com/office/drawing/2014/main" id="{EA9C5DE6-6A68-4D41-AC26-DB04BBB53104}"/>
-              </a:ext>
-            </a:extLst>
-          </p:cNvPr>
-          <p:cNvSpPr>
-            <a:spLocks noGrp="1"/>
-          </p:cNvSpPr>
-          <p:nvPr>
-            <p:ph idx="1"/>
-          </p:nvPr>
-        </p:nvSpPr>
-        <p:spPr/>
-        <p:txBody>
-          <a:bodyPr>
-            <a:normAutofit lnSpcReduction="10000"/>
-          </a:bodyPr>
-          <a:lstStyle/>
-          <a:p>
-            <a:r>
-              <a:rPr lang="en-US" dirty="0"/>
-              <a:t>Text:</a:t>
-            </a:r>
-          </a:p>
-          <a:p>
-            <a:pPr lvl="1"/>
-            <a:r>
-              <a:rPr lang="en-US" dirty="0">
-                <a:latin typeface="Consolas" panose="020B0609020204030204" pitchFamily="49" charset="0"/>
-              </a:rPr>
-              <a:t>string </a:t>
-            </a:r>
-            <a:r>
-              <a:rPr lang="en-US" dirty="0"/>
-              <a:t>= a string, like </a:t>
-            </a:r>
-            <a:r>
-              <a:rPr lang="en-US" dirty="0">
-                <a:latin typeface="Consolas" panose="020B0609020204030204" pitchFamily="49" charset="0"/>
-              </a:rPr>
-              <a:t>"Hello World!"</a:t>
-            </a:r>
-          </a:p>
-          <a:p>
-            <a:pPr lvl="1"/>
-            <a:r>
-              <a:rPr lang="en-US" dirty="0">
-                <a:latin typeface="Consolas" panose="020B0609020204030204" pitchFamily="49" charset="0"/>
-              </a:rPr>
-              <a:t>char </a:t>
-            </a:r>
-            <a:r>
-              <a:rPr lang="en-US" dirty="0"/>
-              <a:t>= a single character, like </a:t>
-            </a:r>
-            <a:r>
-              <a:rPr lang="en-US" dirty="0">
-                <a:latin typeface="Consolas" panose="020B0609020204030204" pitchFamily="49" charset="0"/>
-              </a:rPr>
-              <a:t>'e'</a:t>
-            </a:r>
-            <a:r>
-              <a:rPr lang="en-US" dirty="0"/>
-              <a:t> or </a:t>
-            </a:r>
-            <a:r>
-              <a:rPr lang="en-US" dirty="0">
-                <a:latin typeface="Consolas" panose="020B0609020204030204" pitchFamily="49" charset="0"/>
-              </a:rPr>
-              <a:t>'\t'</a:t>
-            </a:r>
-          </a:p>
-          <a:p>
-            <a:r>
-              <a:rPr lang="en-US" dirty="0"/>
-              <a:t>Numbers:</a:t>
-            </a:r>
-          </a:p>
-          <a:p>
-            <a:pPr lvl="1"/>
-            <a:r>
-              <a:rPr lang="en-US" dirty="0">
-                <a:latin typeface="Consolas" panose="020B0609020204030204" pitchFamily="49" charset="0"/>
-              </a:rPr>
-              <a:t>int </a:t>
-            </a:r>
-            <a:r>
-              <a:rPr lang="en-US" dirty="0"/>
-              <a:t>= an integer, like -2 or 65536</a:t>
-            </a:r>
-          </a:p>
-          <a:p>
-            <a:pPr lvl="1"/>
-            <a:r>
-              <a:rPr lang="en-US" dirty="0" err="1">
-                <a:latin typeface="Consolas" panose="020B0609020204030204" pitchFamily="49" charset="0"/>
-              </a:rPr>
-              <a:t>uint</a:t>
-            </a:r>
-            <a:r>
-              <a:rPr lang="en-US" dirty="0">
-                <a:latin typeface="Consolas" panose="020B0609020204030204" pitchFamily="49" charset="0"/>
-              </a:rPr>
-              <a:t> </a:t>
-            </a:r>
-            <a:r>
-              <a:rPr lang="en-US" dirty="0"/>
-              <a:t>= an </a:t>
-            </a:r>
-            <a:r>
-              <a:rPr lang="en-US" i="1" dirty="0"/>
-              <a:t>unsigned</a:t>
-            </a:r>
-            <a:r>
-              <a:rPr lang="en-US" dirty="0"/>
-              <a:t> integer, i.e. a natural number, like 42</a:t>
-            </a:r>
-          </a:p>
-          <a:p>
-            <a:pPr lvl="1"/>
-            <a:r>
-              <a:rPr lang="en-US" dirty="0">
-                <a:latin typeface="Consolas" panose="020B0609020204030204" pitchFamily="49" charset="0"/>
-              </a:rPr>
-              <a:t>float </a:t>
-            </a:r>
-            <a:r>
-              <a:rPr lang="en-US" dirty="0"/>
-              <a:t>= a “floating-point” number, aka real number, like 3.85</a:t>
-            </a:r>
-          </a:p>
-          <a:p>
-            <a:pPr lvl="1"/>
-            <a:r>
-              <a:rPr lang="en-US" dirty="0">
-                <a:latin typeface="Consolas" panose="020B0609020204030204" pitchFamily="49" charset="0"/>
-              </a:rPr>
-              <a:t>double </a:t>
-            </a:r>
-            <a:r>
-              <a:rPr lang="en-US" dirty="0"/>
-              <a:t>= also a real number (3.85), but with “double precision”</a:t>
-            </a:r>
-          </a:p>
-          <a:p>
-            <a:pPr lvl="1"/>
-            <a:r>
-              <a:rPr lang="en-US" dirty="0">
-                <a:latin typeface="Consolas" panose="020B0609020204030204" pitchFamily="49" charset="0"/>
-              </a:rPr>
-              <a:t>decimal </a:t>
-            </a:r>
-            <a:r>
-              <a:rPr lang="en-US" dirty="0"/>
-              <a:t>= an </a:t>
-            </a:r>
-            <a:r>
-              <a:rPr lang="en-US"/>
-              <a:t>“exact decimal” </a:t>
-            </a:r>
-            <a:r>
-              <a:rPr lang="en-US" dirty="0"/>
-              <a:t>real number with 28 digits of precision</a:t>
-            </a:r>
-          </a:p>
-        </p:txBody>
-      </p:sp>
-      <p:sp>
-        <p:nvSpPr>
-          <p:cNvPr id="4" name="Footer Placeholder 3">
-            <a:extLst>
-              <a:ext uri="{FF2B5EF4-FFF2-40B4-BE49-F238E27FC236}">
-                <a16:creationId xmlns:a16="http://schemas.microsoft.com/office/drawing/2014/main" id="{3C241903-0583-4C88-9889-B105884A008B}"/>
-              </a:ext>
-            </a:extLst>
-          </p:cNvPr>
-          <p:cNvSpPr>
-            <a:spLocks noGrp="1"/>
-          </p:cNvSpPr>
-          <p:nvPr>
-            <p:ph type="ftr" sz="quarter" idx="11"/>
-          </p:nvPr>
-        </p:nvSpPr>
-        <p:spPr/>
-        <p:txBody>
-          <a:bodyPr/>
-          <a:lstStyle/>
-          <a:p>
-            <a:r>
-              <a:rPr lang="en-US"/>
-              <a:t>CSCI 1301</a:t>
-            </a:r>
-          </a:p>
-        </p:txBody>
-      </p:sp>
-    </p:spTree>
-    <p:extLst>
-      <p:ext uri="{BB962C8B-B14F-4D97-AF65-F5344CB8AC3E}">
-        <p14:creationId xmlns:p14="http://schemas.microsoft.com/office/powerpoint/2010/main" val="106207093"/>
-      </p:ext>
-    </p:extLst>
-  </p:cSld>
-  <p:clrMapOvr>
-    <a:masterClrMapping/>
-  </p:clrMapOvr>
-</p:sld>
-</file>
-
-<file path=ppt/slides/slide7.xml><?xml version="1.0" encoding="utf-8"?>
-<p:sld xmlns:a="http://schemas.openxmlformats.org/drawingml/2006/main" xmlns:r="http://schemas.openxmlformats.org/officeDocument/2006/relationships" xmlns:p="http://schemas.openxmlformats.org/presentationml/2006/main">
-  <p:cSld>
-    <p:spTree>
-      <p:nvGrpSpPr>
-        <p:cNvPr id="1" name=""/>
-        <p:cNvGrpSpPr/>
-        <p:nvPr/>
-      </p:nvGrpSpPr>
-      <p:grpSpPr>
-        <a:xfrm>
-          <a:off x="0" y="0"/>
-          <a:ext cx="0" cy="0"/>
-          <a:chOff x="0" y="0"/>
-          <a:chExt cx="0" cy="0"/>
-        </a:xfrm>
-      </p:grpSpPr>
-      <p:sp>
-        <p:nvSpPr>
           <p:cNvPr id="6" name="Title 5"/>
           <p:cNvSpPr>
             <a:spLocks noGrp="1"/>
@@ -12500,7 +12247,7 @@
 </p:sld>
 </file>
 
-<file path=ppt/slides/slide8.xml><?xml version="1.0" encoding="utf-8"?>
+<file path=ppt/slides/slide7.xml><?xml version="1.0" encoding="utf-8"?>
 <p:sld xmlns:a="http://schemas.openxmlformats.org/drawingml/2006/main" xmlns:r="http://schemas.openxmlformats.org/officeDocument/2006/relationships" xmlns:p="http://schemas.openxmlformats.org/presentationml/2006/main">
   <p:cSld>
     <p:spTree>
@@ -13681,7 +13428,7 @@
 </p:sld>
 </file>
 
-<file path=ppt/slides/slide9.xml><?xml version="1.0" encoding="utf-8"?>
+<file path=ppt/slides/slide8.xml><?xml version="1.0" encoding="utf-8"?>
 <p:sld xmlns:a="http://schemas.openxmlformats.org/drawingml/2006/main" xmlns:r="http://schemas.openxmlformats.org/officeDocument/2006/relationships" xmlns:p="http://schemas.openxmlformats.org/presentationml/2006/main">
   <p:cSld>
     <p:spTree>
@@ -15375,6 +15122,137 @@
       <p:bldP spid="12" grpId="0"/>
     </p:bldLst>
   </p:timing>
+</p:sld>
+</file>
+
+<file path=ppt/slides/slide9.xml><?xml version="1.0" encoding="utf-8"?>
+<p:sld xmlns:a="http://schemas.openxmlformats.org/drawingml/2006/main" xmlns:r="http://schemas.openxmlformats.org/officeDocument/2006/relationships" xmlns:p="http://schemas.openxmlformats.org/presentationml/2006/main">
+  <p:cSld>
+    <p:spTree>
+      <p:nvGrpSpPr>
+        <p:cNvPr id="1" name=""/>
+        <p:cNvGrpSpPr/>
+        <p:nvPr/>
+      </p:nvGrpSpPr>
+      <p:grpSpPr>
+        <a:xfrm>
+          <a:off x="0" y="0"/>
+          <a:ext cx="0" cy="0"/>
+          <a:chOff x="0" y="0"/>
+          <a:chExt cx="0" cy="0"/>
+        </a:xfrm>
+      </p:grpSpPr>
+      <p:sp>
+        <p:nvSpPr>
+          <p:cNvPr id="6" name="Title 5"/>
+          <p:cNvSpPr>
+            <a:spLocks noGrp="1"/>
+          </p:cNvSpPr>
+          <p:nvPr>
+            <p:ph type="title"/>
+          </p:nvPr>
+        </p:nvSpPr>
+        <p:spPr/>
+        <p:txBody>
+          <a:bodyPr/>
+          <a:lstStyle/>
+          <a:p>
+            <a:r>
+              <a:rPr lang="en-US" dirty="0"/>
+              <a:t>Outline</a:t>
+            </a:r>
+          </a:p>
+        </p:txBody>
+      </p:sp>
+      <p:sp>
+        <p:nvSpPr>
+          <p:cNvPr id="7" name="Content Placeholder 6"/>
+          <p:cNvSpPr>
+            <a:spLocks noGrp="1"/>
+          </p:cNvSpPr>
+          <p:nvPr>
+            <p:ph idx="1"/>
+          </p:nvPr>
+        </p:nvSpPr>
+        <p:spPr/>
+        <p:txBody>
+          <a:bodyPr>
+            <a:normAutofit/>
+          </a:bodyPr>
+          <a:lstStyle/>
+          <a:p>
+            <a:r>
+              <a:rPr lang="en-US" dirty="0"/>
+              <a:t>Basic C# Datatypes</a:t>
+            </a:r>
+          </a:p>
+          <a:p>
+            <a:r>
+              <a:rPr lang="en-US" dirty="0"/>
+              <a:t>Literals and Variables</a:t>
+            </a:r>
+          </a:p>
+          <a:p>
+            <a:r>
+              <a:rPr lang="en-US" b="1" dirty="0"/>
+              <a:t>Basic Variable Operations</a:t>
+            </a:r>
+          </a:p>
+          <a:p>
+            <a:pPr lvl="1"/>
+            <a:r>
+              <a:rPr lang="en-US" dirty="0"/>
+              <a:t>Declaration</a:t>
+            </a:r>
+          </a:p>
+          <a:p>
+            <a:pPr lvl="1"/>
+            <a:r>
+              <a:rPr lang="en-US" dirty="0"/>
+              <a:t>Assignment</a:t>
+            </a:r>
+          </a:p>
+          <a:p>
+            <a:pPr lvl="1"/>
+            <a:r>
+              <a:rPr lang="en-US" dirty="0"/>
+              <a:t>Displaying</a:t>
+            </a:r>
+          </a:p>
+        </p:txBody>
+      </p:sp>
+      <p:sp>
+        <p:nvSpPr>
+          <p:cNvPr id="4" name="Footer Placeholder 3"/>
+          <p:cNvSpPr>
+            <a:spLocks noGrp="1"/>
+          </p:cNvSpPr>
+          <p:nvPr>
+            <p:ph type="ftr" sz="quarter" idx="11"/>
+          </p:nvPr>
+        </p:nvSpPr>
+        <p:spPr/>
+        <p:txBody>
+          <a:bodyPr/>
+          <a:lstStyle/>
+          <a:p>
+            <a:r>
+              <a:rPr lang="en-US" dirty="0"/>
+              <a:t>CSCI 1301</a:t>
+            </a:r>
+          </a:p>
+        </p:txBody>
+      </p:sp>
+    </p:spTree>
+    <p:extLst>
+      <p:ext uri="{BB962C8B-B14F-4D97-AF65-F5344CB8AC3E}">
+        <p14:creationId xmlns:p14="http://schemas.microsoft.com/office/powerpoint/2010/main" val="2577889060"/>
+      </p:ext>
+    </p:extLst>
+  </p:cSld>
+  <p:clrMapOvr>
+    <a:masterClrMapping/>
+  </p:clrMapOvr>
 </p:sld>
 </file>
 

</xml_diff>

<commit_message>
Added slides on format specifiers
Corresponding to the notes I added, the slides introducing format specifiers can go at the end of the first Datatypes and Variables lecture
</commit_message>
<xml_diff>
--- a/lectures/030_datatypes_and_variables/Datatypes-Variables.pptx
+++ b/lectures/030_datatypes_and_variables/Datatypes-Variables.pptx
@@ -5,10 +5,10 @@
     <p:sldMasterId id="2147483732" r:id="rId1"/>
   </p:sldMasterIdLst>
   <p:notesMasterIdLst>
-    <p:notesMasterId r:id="rId18"/>
+    <p:notesMasterId r:id="rId22"/>
   </p:notesMasterIdLst>
   <p:handoutMasterIdLst>
-    <p:handoutMasterId r:id="rId19"/>
+    <p:handoutMasterId r:id="rId23"/>
   </p:handoutMasterIdLst>
   <p:sldIdLst>
     <p:sldId id="256" r:id="rId2"/>
@@ -26,7 +26,11 @@
     <p:sldId id="318" r:id="rId14"/>
     <p:sldId id="319" r:id="rId15"/>
     <p:sldId id="320" r:id="rId16"/>
-    <p:sldId id="321" r:id="rId17"/>
+    <p:sldId id="328" r:id="rId17"/>
+    <p:sldId id="325" r:id="rId18"/>
+    <p:sldId id="326" r:id="rId19"/>
+    <p:sldId id="327" r:id="rId20"/>
+    <p:sldId id="329" r:id="rId21"/>
   </p:sldIdLst>
   <p:sldSz cx="12188825" cy="6858000"/>
   <p:notesSz cx="6858000" cy="9144000"/>
@@ -1588,7 +1592,7 @@
           <a:p>
             <a:fld id="{2507D560-C4D4-4804-8CBF-2C56AB6C6DB9}" type="datetimeFigureOut">
               <a:rPr lang="en-US" smtClean="0"/>
-              <a:t>8/16/2021</a:t>
+              <a:t>8/23/2021</a:t>
             </a:fld>
             <a:endParaRPr lang="en-US"/>
           </a:p>
@@ -1753,7 +1757,7 @@
           <a:p>
             <a:fld id="{688E7586-9A7B-41FF-B169-85DADA744493}" type="datetimeFigureOut">
               <a:rPr lang="en-US" smtClean="0"/>
-              <a:t>8/16/2021</a:t>
+              <a:t>8/23/2021</a:t>
             </a:fld>
             <a:endParaRPr lang="en-US"/>
           </a:p>
@@ -5461,14 +5465,13 @@
           </a:p>
           <a:p>
             <a:r>
-              <a:rPr lang="en-US" smtClean="0"/>
+              <a:rPr lang="en-US"/>
               <a:t>Spring/Fall </a:t>
             </a:r>
             <a:r>
-              <a:rPr lang="en-US" dirty="0" smtClean="0"/>
+              <a:rPr lang="en-US" dirty="0"/>
               <a:t>20XX</a:t>
             </a:r>
-            <a:endParaRPr lang="en-US" dirty="0"/>
           </a:p>
         </p:txBody>
       </p:sp>
@@ -9100,14 +9103,8 @@
           <a:lstStyle/>
           <a:p>
             <a:r>
-              <a:rPr lang="en-US" dirty="0" err="1">
-                <a:latin typeface="Consolas" panose="020B0609020204030204" pitchFamily="49" charset="0"/>
-              </a:rPr>
-              <a:t>Console.WriteLine</a:t>
-            </a:r>
-            <a:r>
-              <a:rPr lang="en-US" dirty="0"/>
-              <a:t> can only print text</a:t>
+              <a:rPr lang="en-US" dirty="0"/>
+              <a:t>The console/terminal can only print text</a:t>
             </a:r>
           </a:p>
           <a:p>
@@ -10339,7 +10336,7 @@
           <a:p>
             <a:r>
               <a:rPr lang="en-US" dirty="0"/>
-              <a:t>That’s All For Today</a:t>
+              <a:t>Outline</a:t>
             </a:r>
           </a:p>
         </p:txBody>
@@ -10399,6 +10396,12 @@
               <a:t>Displaying</a:t>
             </a:r>
           </a:p>
+          <a:p>
+            <a:r>
+              <a:rPr lang="en-US" b="1" dirty="0"/>
+              <a:t>Format Specifiers</a:t>
+            </a:r>
+          </a:p>
         </p:txBody>
       </p:sp>
       <p:sp>
@@ -10426,7 +10429,1586 @@
     </p:spTree>
     <p:extLst>
       <p:ext uri="{BB962C8B-B14F-4D97-AF65-F5344CB8AC3E}">
-        <p14:creationId xmlns:p14="http://schemas.microsoft.com/office/powerpoint/2010/main" val="1281988797"/>
+        <p14:creationId xmlns:p14="http://schemas.microsoft.com/office/powerpoint/2010/main" val="4235023375"/>
+      </p:ext>
+    </p:extLst>
+  </p:cSld>
+  <p:clrMapOvr>
+    <a:masterClrMapping/>
+  </p:clrMapOvr>
+</p:sld>
+</file>
+
+<file path=ppt/slides/slide17.xml><?xml version="1.0" encoding="utf-8"?>
+<p:sld xmlns:a="http://schemas.openxmlformats.org/drawingml/2006/main" xmlns:r="http://schemas.openxmlformats.org/officeDocument/2006/relationships" xmlns:p="http://schemas.openxmlformats.org/presentationml/2006/main">
+  <p:cSld>
+    <p:spTree>
+      <p:nvGrpSpPr>
+        <p:cNvPr id="1" name=""/>
+        <p:cNvGrpSpPr/>
+        <p:nvPr/>
+      </p:nvGrpSpPr>
+      <p:grpSpPr>
+        <a:xfrm>
+          <a:off x="0" y="0"/>
+          <a:ext cx="0" cy="0"/>
+          <a:chOff x="0" y="0"/>
+          <a:chExt cx="0" cy="0"/>
+        </a:xfrm>
+      </p:grpSpPr>
+      <p:sp>
+        <p:nvSpPr>
+          <p:cNvPr id="2" name="Title 1">
+            <a:extLst>
+              <a:ext uri="{FF2B5EF4-FFF2-40B4-BE49-F238E27FC236}">
+                <a16:creationId xmlns:a16="http://schemas.microsoft.com/office/drawing/2014/main" id="{C6B5948E-973F-47AC-9BA2-3D12531D9D6C}"/>
+              </a:ext>
+            </a:extLst>
+          </p:cNvPr>
+          <p:cNvSpPr>
+            <a:spLocks noGrp="1"/>
+          </p:cNvSpPr>
+          <p:nvPr>
+            <p:ph type="title"/>
+          </p:nvPr>
+        </p:nvSpPr>
+        <p:spPr/>
+        <p:txBody>
+          <a:bodyPr>
+            <a:normAutofit/>
+          </a:bodyPr>
+          <a:lstStyle/>
+          <a:p>
+            <a:r>
+              <a:rPr lang="en-US" dirty="0"/>
+              <a:t>Output Formatting</a:t>
+            </a:r>
+          </a:p>
+        </p:txBody>
+      </p:sp>
+      <p:sp>
+        <p:nvSpPr>
+          <p:cNvPr id="3" name="Content Placeholder 2">
+            <a:extLst>
+              <a:ext uri="{FF2B5EF4-FFF2-40B4-BE49-F238E27FC236}">
+                <a16:creationId xmlns:a16="http://schemas.microsoft.com/office/drawing/2014/main" id="{F3D2350E-44C2-40A3-90DF-4FE3E6BA12E4}"/>
+              </a:ext>
+            </a:extLst>
+          </p:cNvPr>
+          <p:cNvSpPr>
+            <a:spLocks noGrp="1"/>
+          </p:cNvSpPr>
+          <p:nvPr>
+            <p:ph idx="1"/>
+          </p:nvPr>
+        </p:nvSpPr>
+        <p:spPr/>
+        <p:txBody>
+          <a:bodyPr/>
+          <a:lstStyle/>
+          <a:p>
+            <a:r>
+              <a:rPr lang="en-US" dirty="0"/>
+              <a:t>Lots of ways to print numbers, especially fractions</a:t>
+            </a:r>
+          </a:p>
+          <a:p>
+            <a:r>
+              <a:rPr lang="en-US" dirty="0"/>
+              <a:t>C#’s default might not be what you want</a:t>
+            </a:r>
+          </a:p>
+        </p:txBody>
+      </p:sp>
+      <p:sp>
+        <p:nvSpPr>
+          <p:cNvPr id="4" name="Footer Placeholder 3">
+            <a:extLst>
+              <a:ext uri="{FF2B5EF4-FFF2-40B4-BE49-F238E27FC236}">
+                <a16:creationId xmlns:a16="http://schemas.microsoft.com/office/drawing/2014/main" id="{D27E1885-BA95-451A-89B4-10F13B623DE9}"/>
+              </a:ext>
+            </a:extLst>
+          </p:cNvPr>
+          <p:cNvSpPr>
+            <a:spLocks noGrp="1"/>
+          </p:cNvSpPr>
+          <p:nvPr>
+            <p:ph type="ftr" sz="quarter" idx="11"/>
+          </p:nvPr>
+        </p:nvSpPr>
+        <p:spPr/>
+        <p:txBody>
+          <a:bodyPr/>
+          <a:lstStyle/>
+          <a:p>
+            <a:r>
+              <a:rPr lang="en-US"/>
+              <a:t>CSCI 1301</a:t>
+            </a:r>
+          </a:p>
+        </p:txBody>
+      </p:sp>
+      <p:sp>
+        <p:nvSpPr>
+          <p:cNvPr id="5" name="TextBox 4">
+            <a:extLst>
+              <a:ext uri="{FF2B5EF4-FFF2-40B4-BE49-F238E27FC236}">
+                <a16:creationId xmlns:a16="http://schemas.microsoft.com/office/drawing/2014/main" id="{C8CCC795-3E0D-4CD4-8704-0BCD0F9293FE}"/>
+              </a:ext>
+            </a:extLst>
+          </p:cNvPr>
+          <p:cNvSpPr txBox="1"/>
+          <p:nvPr/>
+        </p:nvSpPr>
+        <p:spPr>
+          <a:xfrm>
+            <a:off x="2093912" y="2667000"/>
+            <a:ext cx="8001000" cy="1981953"/>
+          </a:xfrm>
+          <a:prstGeom prst="rect">
+            <a:avLst/>
+          </a:prstGeom>
+          <a:solidFill>
+            <a:schemeClr val="bg1">
+              <a:lumMod val="85000"/>
+              <a:lumOff val="15000"/>
+            </a:schemeClr>
+          </a:solidFill>
+        </p:spPr>
+        <p:txBody>
+          <a:bodyPr wrap="square" rtlCol="0">
+            <a:spAutoFit/>
+          </a:bodyPr>
+          <a:lstStyle>
+            <a:defPPr>
+              <a:defRPr lang="en-US"/>
+            </a:defPPr>
+            <a:lvl1pPr>
+              <a:defRPr sz="2200">
+                <a:solidFill>
+                  <a:srgbClr val="0099FF"/>
+                </a:solidFill>
+                <a:latin typeface="Consolas" panose="020B0609020204030204" pitchFamily="49" charset="0"/>
+              </a:defRPr>
+            </a:lvl1pPr>
+          </a:lstStyle>
+          <a:p>
+            <a:pPr>
+              <a:lnSpc>
+                <a:spcPct val="113000"/>
+              </a:lnSpc>
+            </a:pPr>
+            <a:r>
+              <a:rPr lang="en-US" dirty="0"/>
+              <a:t>decimal</a:t>
+            </a:r>
+            <a:r>
+              <a:rPr lang="en-US" dirty="0">
+                <a:solidFill>
+                  <a:schemeClr val="tx1"/>
+                </a:solidFill>
+              </a:rPr>
+              <a:t> price = </a:t>
+            </a:r>
+            <a:r>
+              <a:rPr lang="en-US" dirty="0">
+                <a:solidFill>
+                  <a:srgbClr val="99CC00"/>
+                </a:solidFill>
+              </a:rPr>
+              <a:t>19.99m</a:t>
+            </a:r>
+            <a:r>
+              <a:rPr lang="en-US" dirty="0">
+                <a:solidFill>
+                  <a:schemeClr val="tx1"/>
+                </a:solidFill>
+              </a:rPr>
+              <a:t>;</a:t>
+            </a:r>
+          </a:p>
+          <a:p>
+            <a:pPr>
+              <a:lnSpc>
+                <a:spcPct val="113000"/>
+              </a:lnSpc>
+            </a:pPr>
+            <a:r>
+              <a:rPr lang="en-US" dirty="0"/>
+              <a:t>decimal</a:t>
+            </a:r>
+            <a:r>
+              <a:rPr lang="en-US" dirty="0">
+                <a:solidFill>
+                  <a:schemeClr val="tx1"/>
+                </a:solidFill>
+              </a:rPr>
+              <a:t> discount = </a:t>
+            </a:r>
+            <a:r>
+              <a:rPr lang="en-US" dirty="0">
+                <a:solidFill>
+                  <a:srgbClr val="99CC00"/>
+                </a:solidFill>
+              </a:rPr>
+              <a:t>0.25m</a:t>
+            </a:r>
+            <a:r>
+              <a:rPr lang="en-US" dirty="0">
+                <a:solidFill>
+                  <a:schemeClr val="tx1"/>
+                </a:solidFill>
+              </a:rPr>
+              <a:t>;</a:t>
+            </a:r>
+          </a:p>
+          <a:p>
+            <a:pPr>
+              <a:lnSpc>
+                <a:spcPct val="113000"/>
+              </a:lnSpc>
+            </a:pPr>
+            <a:r>
+              <a:rPr lang="en-US" dirty="0"/>
+              <a:t>decimal</a:t>
+            </a:r>
+            <a:r>
+              <a:rPr lang="en-US" dirty="0">
+                <a:solidFill>
+                  <a:schemeClr val="tx1"/>
+                </a:solidFill>
+              </a:rPr>
+              <a:t> </a:t>
+            </a:r>
+            <a:r>
+              <a:rPr lang="en-US" dirty="0" err="1">
+                <a:solidFill>
+                  <a:schemeClr val="tx1"/>
+                </a:solidFill>
+              </a:rPr>
+              <a:t>salePrice</a:t>
+            </a:r>
+            <a:r>
+              <a:rPr lang="en-US" dirty="0">
+                <a:solidFill>
+                  <a:schemeClr val="tx1"/>
+                </a:solidFill>
+              </a:rPr>
+              <a:t> = price – discount * price;</a:t>
+            </a:r>
+          </a:p>
+          <a:p>
+            <a:pPr>
+              <a:lnSpc>
+                <a:spcPct val="113000"/>
+              </a:lnSpc>
+            </a:pPr>
+            <a:r>
+              <a:rPr lang="en-US" dirty="0" err="1">
+                <a:solidFill>
+                  <a:srgbClr val="66FFCC"/>
+                </a:solidFill>
+              </a:rPr>
+              <a:t>Console</a:t>
+            </a:r>
+            <a:r>
+              <a:rPr lang="en-US" dirty="0" err="1">
+                <a:solidFill>
+                  <a:schemeClr val="tx1"/>
+                </a:solidFill>
+              </a:rPr>
+              <a:t>.</a:t>
+            </a:r>
+            <a:r>
+              <a:rPr lang="en-US" dirty="0" err="1">
+                <a:solidFill>
+                  <a:srgbClr val="CC9900"/>
+                </a:solidFill>
+              </a:rPr>
+              <a:t>WriteLine</a:t>
+            </a:r>
+            <a:r>
+              <a:rPr lang="en-US" dirty="0">
+                <a:solidFill>
+                  <a:schemeClr val="tx1"/>
+                </a:solidFill>
+              </a:rPr>
+              <a:t>(</a:t>
+            </a:r>
+            <a:r>
+              <a:rPr lang="en-US" dirty="0">
+                <a:solidFill>
+                  <a:srgbClr val="FF5050"/>
+                </a:solidFill>
+              </a:rPr>
+              <a:t>$"</a:t>
+            </a:r>
+            <a:r>
+              <a:rPr lang="en-US" dirty="0">
+                <a:solidFill>
+                  <a:srgbClr val="99CCFF"/>
+                </a:solidFill>
+              </a:rPr>
+              <a:t>{price}</a:t>
+            </a:r>
+            <a:r>
+              <a:rPr lang="en-US" dirty="0">
+                <a:solidFill>
+                  <a:srgbClr val="FF5050"/>
+                </a:solidFill>
+              </a:rPr>
+              <a:t> with a discount of " </a:t>
+            </a:r>
+            <a:r>
+              <a:rPr lang="en-US" dirty="0">
+                <a:solidFill>
+                  <a:schemeClr val="tx1"/>
+                </a:solidFill>
+              </a:rPr>
+              <a:t>+</a:t>
+            </a:r>
+          </a:p>
+          <a:p>
+            <a:pPr>
+              <a:lnSpc>
+                <a:spcPct val="113000"/>
+              </a:lnSpc>
+            </a:pPr>
+            <a:r>
+              <a:rPr lang="en-US" dirty="0">
+                <a:solidFill>
+                  <a:srgbClr val="FF5050"/>
+                </a:solidFill>
+              </a:rPr>
+              <a:t>      $"</a:t>
+            </a:r>
+            <a:r>
+              <a:rPr lang="en-US" dirty="0">
+                <a:solidFill>
+                  <a:srgbClr val="99CCFF"/>
+                </a:solidFill>
+              </a:rPr>
+              <a:t>{discount}</a:t>
+            </a:r>
+            <a:r>
+              <a:rPr lang="en-US" dirty="0">
+                <a:solidFill>
+                  <a:srgbClr val="FF5050"/>
+                </a:solidFill>
+              </a:rPr>
+              <a:t> is </a:t>
+            </a:r>
+            <a:r>
+              <a:rPr lang="en-US" dirty="0">
+                <a:solidFill>
+                  <a:srgbClr val="99CCFF"/>
+                </a:solidFill>
+              </a:rPr>
+              <a:t>{</a:t>
+            </a:r>
+            <a:r>
+              <a:rPr lang="en-US" dirty="0" err="1">
+                <a:solidFill>
+                  <a:srgbClr val="99CCFF"/>
+                </a:solidFill>
+              </a:rPr>
+              <a:t>salePrice</a:t>
+            </a:r>
+            <a:r>
+              <a:rPr lang="en-US" dirty="0">
+                <a:solidFill>
+                  <a:srgbClr val="99CCFF"/>
+                </a:solidFill>
+              </a:rPr>
+              <a:t>}</a:t>
+            </a:r>
+            <a:r>
+              <a:rPr lang="en-US" dirty="0">
+                <a:solidFill>
+                  <a:srgbClr val="FF5050"/>
+                </a:solidFill>
+              </a:rPr>
+              <a:t>"</a:t>
+            </a:r>
+            <a:r>
+              <a:rPr lang="en-US" dirty="0">
+                <a:solidFill>
+                  <a:schemeClr val="tx1"/>
+                </a:solidFill>
+              </a:rPr>
+              <a:t>);</a:t>
+            </a:r>
+          </a:p>
+        </p:txBody>
+      </p:sp>
+      <p:sp>
+        <p:nvSpPr>
+          <p:cNvPr id="6" name="Rectangle 5">
+            <a:extLst>
+              <a:ext uri="{FF2B5EF4-FFF2-40B4-BE49-F238E27FC236}">
+                <a16:creationId xmlns:a16="http://schemas.microsoft.com/office/drawing/2014/main" id="{CE672540-8A08-4F72-B36E-7D6295B64349}"/>
+              </a:ext>
+            </a:extLst>
+          </p:cNvPr>
+          <p:cNvSpPr/>
+          <p:nvPr/>
+        </p:nvSpPr>
+        <p:spPr>
+          <a:xfrm>
+            <a:off x="2551112" y="5410953"/>
+            <a:ext cx="7086600" cy="837448"/>
+          </a:xfrm>
+          <a:prstGeom prst="rect">
+            <a:avLst/>
+          </a:prstGeom>
+          <a:solidFill>
+            <a:schemeClr val="bg1">
+              <a:lumMod val="85000"/>
+              <a:lumOff val="15000"/>
+            </a:schemeClr>
+          </a:solidFill>
+          <a:ln>
+            <a:solidFill>
+              <a:schemeClr val="bg1"/>
+            </a:solidFill>
+          </a:ln>
+        </p:spPr>
+        <p:style>
+          <a:lnRef idx="2">
+            <a:schemeClr val="accent1">
+              <a:shade val="50000"/>
+            </a:schemeClr>
+          </a:lnRef>
+          <a:fillRef idx="1">
+            <a:schemeClr val="accent1"/>
+          </a:fillRef>
+          <a:effectRef idx="0">
+            <a:schemeClr val="accent1"/>
+          </a:effectRef>
+          <a:fontRef idx="minor">
+            <a:schemeClr val="lt1"/>
+          </a:fontRef>
+        </p:style>
+        <p:txBody>
+          <a:bodyPr rtlCol="0" anchor="t"/>
+          <a:lstStyle/>
+          <a:p>
+            <a:r>
+              <a:rPr lang="en-US" dirty="0">
+                <a:latin typeface="Consolas" panose="020B0609020204030204" pitchFamily="49" charset="0"/>
+              </a:rPr>
+              <a:t>19.99 with a discount of 0.25 is 14.9925</a:t>
+            </a:r>
+          </a:p>
+        </p:txBody>
+      </p:sp>
+      <p:sp>
+        <p:nvSpPr>
+          <p:cNvPr id="7" name="Arrow: Down 6">
+            <a:extLst>
+              <a:ext uri="{FF2B5EF4-FFF2-40B4-BE49-F238E27FC236}">
+                <a16:creationId xmlns:a16="http://schemas.microsoft.com/office/drawing/2014/main" id="{46A8817B-67A6-45CC-87C5-7A7105140BD0}"/>
+              </a:ext>
+            </a:extLst>
+          </p:cNvPr>
+          <p:cNvSpPr/>
+          <p:nvPr/>
+        </p:nvSpPr>
+        <p:spPr>
+          <a:xfrm>
+            <a:off x="5865812" y="4724400"/>
+            <a:ext cx="457200" cy="533400"/>
+          </a:xfrm>
+          <a:prstGeom prst="downArrow">
+            <a:avLst/>
+          </a:prstGeom>
+        </p:spPr>
+        <p:style>
+          <a:lnRef idx="2">
+            <a:schemeClr val="accent1">
+              <a:shade val="50000"/>
+            </a:schemeClr>
+          </a:lnRef>
+          <a:fillRef idx="1">
+            <a:schemeClr val="accent1"/>
+          </a:fillRef>
+          <a:effectRef idx="0">
+            <a:schemeClr val="accent1"/>
+          </a:effectRef>
+          <a:fontRef idx="minor">
+            <a:schemeClr val="lt1"/>
+          </a:fontRef>
+        </p:style>
+        <p:txBody>
+          <a:bodyPr rtlCol="0" anchor="ctr"/>
+          <a:lstStyle/>
+          <a:p>
+            <a:pPr algn="ctr"/>
+            <a:endParaRPr lang="en-US"/>
+          </a:p>
+        </p:txBody>
+      </p:sp>
+    </p:spTree>
+    <p:extLst>
+      <p:ext uri="{BB962C8B-B14F-4D97-AF65-F5344CB8AC3E}">
+        <p14:creationId xmlns:p14="http://schemas.microsoft.com/office/powerpoint/2010/main" val="571636674"/>
+      </p:ext>
+    </p:extLst>
+  </p:cSld>
+  <p:clrMapOvr>
+    <a:masterClrMapping/>
+  </p:clrMapOvr>
+</p:sld>
+</file>
+
+<file path=ppt/slides/slide18.xml><?xml version="1.0" encoding="utf-8"?>
+<p:sld xmlns:a="http://schemas.openxmlformats.org/drawingml/2006/main" xmlns:r="http://schemas.openxmlformats.org/officeDocument/2006/relationships" xmlns:p="http://schemas.openxmlformats.org/presentationml/2006/main">
+  <p:cSld>
+    <p:spTree>
+      <p:nvGrpSpPr>
+        <p:cNvPr id="1" name=""/>
+        <p:cNvGrpSpPr/>
+        <p:nvPr/>
+      </p:nvGrpSpPr>
+      <p:grpSpPr>
+        <a:xfrm>
+          <a:off x="0" y="0"/>
+          <a:ext cx="0" cy="0"/>
+          <a:chOff x="0" y="0"/>
+          <a:chExt cx="0" cy="0"/>
+        </a:xfrm>
+      </p:grpSpPr>
+      <p:sp>
+        <p:nvSpPr>
+          <p:cNvPr id="2" name="Title 1">
+            <a:extLst>
+              <a:ext uri="{FF2B5EF4-FFF2-40B4-BE49-F238E27FC236}">
+                <a16:creationId xmlns:a16="http://schemas.microsoft.com/office/drawing/2014/main" id="{9F7E6F85-9DF2-4364-B8E8-317EE84BEA9C}"/>
+              </a:ext>
+            </a:extLst>
+          </p:cNvPr>
+          <p:cNvSpPr>
+            <a:spLocks noGrp="1"/>
+          </p:cNvSpPr>
+          <p:nvPr>
+            <p:ph type="title"/>
+          </p:nvPr>
+        </p:nvSpPr>
+        <p:spPr/>
+        <p:txBody>
+          <a:bodyPr/>
+          <a:lstStyle/>
+          <a:p>
+            <a:r>
+              <a:rPr lang="en-US" dirty="0"/>
+              <a:t>Better String Interpolation</a:t>
+            </a:r>
+          </a:p>
+        </p:txBody>
+      </p:sp>
+      <p:sp>
+        <p:nvSpPr>
+          <p:cNvPr id="3" name="Content Placeholder 2">
+            <a:extLst>
+              <a:ext uri="{FF2B5EF4-FFF2-40B4-BE49-F238E27FC236}">
+                <a16:creationId xmlns:a16="http://schemas.microsoft.com/office/drawing/2014/main" id="{43C8D800-7A79-4D4E-8DDF-0AF100FE1968}"/>
+              </a:ext>
+            </a:extLst>
+          </p:cNvPr>
+          <p:cNvSpPr>
+            <a:spLocks noGrp="1"/>
+          </p:cNvSpPr>
+          <p:nvPr>
+            <p:ph idx="1"/>
+          </p:nvPr>
+        </p:nvSpPr>
+        <p:spPr>
+          <a:xfrm>
+            <a:off x="227013" y="1371600"/>
+            <a:ext cx="11734800" cy="1447800"/>
+          </a:xfrm>
+        </p:spPr>
+        <p:txBody>
+          <a:bodyPr/>
+          <a:lstStyle/>
+          <a:p>
+            <a:r>
+              <a:rPr lang="en-US" dirty="0"/>
+              <a:t>Can change how numbers are printed with a </a:t>
+            </a:r>
+            <a:r>
+              <a:rPr lang="en-US" b="1" dirty="0"/>
+              <a:t>format specifier</a:t>
+            </a:r>
+            <a:endParaRPr lang="en-US" dirty="0"/>
+          </a:p>
+          <a:p>
+            <a:r>
+              <a:rPr lang="en-US" dirty="0"/>
+              <a:t>Goes inside braces, after a colon:  </a:t>
+            </a:r>
+            <a:r>
+              <a:rPr lang="en-US" dirty="0">
+                <a:latin typeface="Consolas" panose="020B0609020204030204" pitchFamily="49" charset="0"/>
+              </a:rPr>
+              <a:t>{</a:t>
+            </a:r>
+            <a:r>
+              <a:rPr lang="en-US" dirty="0" err="1">
+                <a:latin typeface="Consolas" panose="020B0609020204030204" pitchFamily="49" charset="0"/>
+              </a:rPr>
+              <a:t>numVar:N</a:t>
+            </a:r>
+            <a:r>
+              <a:rPr lang="en-US" dirty="0">
+                <a:latin typeface="Consolas" panose="020B0609020204030204" pitchFamily="49" charset="0"/>
+              </a:rPr>
+              <a:t>}</a:t>
+            </a:r>
+          </a:p>
+        </p:txBody>
+      </p:sp>
+      <p:sp>
+        <p:nvSpPr>
+          <p:cNvPr id="4" name="Footer Placeholder 3">
+            <a:extLst>
+              <a:ext uri="{FF2B5EF4-FFF2-40B4-BE49-F238E27FC236}">
+                <a16:creationId xmlns:a16="http://schemas.microsoft.com/office/drawing/2014/main" id="{004C6809-8D0D-4B9E-BAAC-CC19D5C07AAE}"/>
+              </a:ext>
+            </a:extLst>
+          </p:cNvPr>
+          <p:cNvSpPr>
+            <a:spLocks noGrp="1"/>
+          </p:cNvSpPr>
+          <p:nvPr>
+            <p:ph type="ftr" sz="quarter" idx="11"/>
+          </p:nvPr>
+        </p:nvSpPr>
+        <p:spPr/>
+        <p:txBody>
+          <a:bodyPr/>
+          <a:lstStyle/>
+          <a:p>
+            <a:r>
+              <a:rPr lang="en-US"/>
+              <a:t>CSCI 1301</a:t>
+            </a:r>
+          </a:p>
+        </p:txBody>
+      </p:sp>
+      <p:sp>
+        <p:nvSpPr>
+          <p:cNvPr id="13" name="TextBox 12">
+            <a:extLst>
+              <a:ext uri="{FF2B5EF4-FFF2-40B4-BE49-F238E27FC236}">
+                <a16:creationId xmlns:a16="http://schemas.microsoft.com/office/drawing/2014/main" id="{CBA31970-60B7-4CA7-803C-7DE3DE165E67}"/>
+              </a:ext>
+            </a:extLst>
+          </p:cNvPr>
+          <p:cNvSpPr txBox="1"/>
+          <p:nvPr/>
+        </p:nvSpPr>
+        <p:spPr>
+          <a:xfrm>
+            <a:off x="4993240" y="2479229"/>
+            <a:ext cx="2042547" cy="461665"/>
+          </a:xfrm>
+          <a:prstGeom prst="rect">
+            <a:avLst/>
+          </a:prstGeom>
+          <a:noFill/>
+        </p:spPr>
+        <p:txBody>
+          <a:bodyPr wrap="none" rtlCol="0">
+            <a:spAutoFit/>
+          </a:bodyPr>
+          <a:lstStyle/>
+          <a:p>
+            <a:r>
+              <a:rPr lang="en-US" dirty="0"/>
+              <a:t>Numeric value</a:t>
+            </a:r>
+          </a:p>
+        </p:txBody>
+      </p:sp>
+      <p:cxnSp>
+        <p:nvCxnSpPr>
+          <p:cNvPr id="6" name="Straight Arrow Connector 5">
+            <a:extLst>
+              <a:ext uri="{FF2B5EF4-FFF2-40B4-BE49-F238E27FC236}">
+                <a16:creationId xmlns:a16="http://schemas.microsoft.com/office/drawing/2014/main" id="{A3C8DA4B-1079-468C-93CD-B2C2B0D08FD0}"/>
+              </a:ext>
+            </a:extLst>
+          </p:cNvPr>
+          <p:cNvCxnSpPr>
+            <a:cxnSpLocks/>
+            <a:stCxn id="15" idx="1"/>
+          </p:cNvCxnSpPr>
+          <p:nvPr/>
+        </p:nvCxnSpPr>
+        <p:spPr>
+          <a:xfrm flipH="1" flipV="1">
+            <a:off x="8532812" y="2469715"/>
+            <a:ext cx="348344" cy="240346"/>
+          </a:xfrm>
+          <a:prstGeom prst="straightConnector1">
+            <a:avLst/>
+          </a:prstGeom>
+          <a:ln>
+            <a:tailEnd type="triangle"/>
+          </a:ln>
+        </p:spPr>
+        <p:style>
+          <a:lnRef idx="2">
+            <a:schemeClr val="accent6"/>
+          </a:lnRef>
+          <a:fillRef idx="0">
+            <a:schemeClr val="accent6"/>
+          </a:fillRef>
+          <a:effectRef idx="1">
+            <a:schemeClr val="accent6"/>
+          </a:effectRef>
+          <a:fontRef idx="minor">
+            <a:schemeClr val="tx1"/>
+          </a:fontRef>
+        </p:style>
+      </p:cxnSp>
+      <p:cxnSp>
+        <p:nvCxnSpPr>
+          <p:cNvPr id="11" name="Straight Arrow Connector 10">
+            <a:extLst>
+              <a:ext uri="{FF2B5EF4-FFF2-40B4-BE49-F238E27FC236}">
+                <a16:creationId xmlns:a16="http://schemas.microsoft.com/office/drawing/2014/main" id="{EA21C708-73E9-4C81-9CE8-CC96189B77AC}"/>
+              </a:ext>
+            </a:extLst>
+          </p:cNvPr>
+          <p:cNvCxnSpPr>
+            <a:cxnSpLocks/>
+            <a:stCxn id="13" idx="3"/>
+          </p:cNvCxnSpPr>
+          <p:nvPr/>
+        </p:nvCxnSpPr>
+        <p:spPr>
+          <a:xfrm flipV="1">
+            <a:off x="7035787" y="2469716"/>
+            <a:ext cx="427585" cy="240346"/>
+          </a:xfrm>
+          <a:prstGeom prst="straightConnector1">
+            <a:avLst/>
+          </a:prstGeom>
+          <a:ln>
+            <a:tailEnd type="triangle"/>
+          </a:ln>
+        </p:spPr>
+        <p:style>
+          <a:lnRef idx="2">
+            <a:schemeClr val="accent6"/>
+          </a:lnRef>
+          <a:fillRef idx="0">
+            <a:schemeClr val="accent6"/>
+          </a:fillRef>
+          <a:effectRef idx="1">
+            <a:schemeClr val="accent6"/>
+          </a:effectRef>
+          <a:fontRef idx="minor">
+            <a:schemeClr val="tx1"/>
+          </a:fontRef>
+        </p:style>
+      </p:cxnSp>
+      <p:sp>
+        <p:nvSpPr>
+          <p:cNvPr id="15" name="TextBox 14">
+            <a:extLst>
+              <a:ext uri="{FF2B5EF4-FFF2-40B4-BE49-F238E27FC236}">
+                <a16:creationId xmlns:a16="http://schemas.microsoft.com/office/drawing/2014/main" id="{C2853E27-3660-4260-8327-1F6F76553820}"/>
+              </a:ext>
+            </a:extLst>
+          </p:cNvPr>
+          <p:cNvSpPr txBox="1"/>
+          <p:nvPr/>
+        </p:nvSpPr>
+        <p:spPr>
+          <a:xfrm>
+            <a:off x="8881156" y="2479228"/>
+            <a:ext cx="2300630" cy="461665"/>
+          </a:xfrm>
+          <a:prstGeom prst="rect">
+            <a:avLst/>
+          </a:prstGeom>
+          <a:noFill/>
+        </p:spPr>
+        <p:txBody>
+          <a:bodyPr wrap="none" rtlCol="0">
+            <a:spAutoFit/>
+          </a:bodyPr>
+          <a:lstStyle/>
+          <a:p>
+            <a:r>
+              <a:rPr lang="en-US" dirty="0"/>
+              <a:t>Format specifier</a:t>
+            </a:r>
+          </a:p>
+        </p:txBody>
+      </p:sp>
+      <p:graphicFrame>
+        <p:nvGraphicFramePr>
+          <p:cNvPr id="19" name="Table 19">
+            <a:extLst>
+              <a:ext uri="{FF2B5EF4-FFF2-40B4-BE49-F238E27FC236}">
+                <a16:creationId xmlns:a16="http://schemas.microsoft.com/office/drawing/2014/main" id="{7E1E3CBF-B529-4592-ADC6-19D16E0D69D8}"/>
+              </a:ext>
+            </a:extLst>
+          </p:cNvPr>
+          <p:cNvGraphicFramePr>
+            <a:graphicFrameLocks noGrp="1"/>
+          </p:cNvGraphicFramePr>
+          <p:nvPr/>
+        </p:nvGraphicFramePr>
+        <p:xfrm>
+          <a:off x="1293812" y="2982646"/>
+          <a:ext cx="9144000" cy="3167400"/>
+        </p:xfrm>
+        <a:graphic>
+          <a:graphicData uri="http://schemas.openxmlformats.org/drawingml/2006/table">
+            <a:tbl>
+              <a:tblPr firstRow="1" bandRow="1">
+                <a:tableStyleId>{5C22544A-7EE6-4342-B048-85BDC9FD1C3A}</a:tableStyleId>
+              </a:tblPr>
+              <a:tblGrid>
+                <a:gridCol w="2362200">
+                  <a:extLst>
+                    <a:ext uri="{9D8B030D-6E8A-4147-A177-3AD203B41FA5}">
+                      <a16:colId xmlns:a16="http://schemas.microsoft.com/office/drawing/2014/main" val="3058478530"/>
+                    </a:ext>
+                  </a:extLst>
+                </a:gridCol>
+                <a:gridCol w="6781800">
+                  <a:extLst>
+                    <a:ext uri="{9D8B030D-6E8A-4147-A177-3AD203B41FA5}">
+                      <a16:colId xmlns:a16="http://schemas.microsoft.com/office/drawing/2014/main" val="2316850972"/>
+                    </a:ext>
+                  </a:extLst>
+                </a:gridCol>
+              </a:tblGrid>
+              <a:tr h="507160">
+                <a:tc>
+                  <a:txBody>
+                    <a:bodyPr/>
+                    <a:lstStyle/>
+                    <a:p>
+                      <a:r>
+                        <a:rPr lang="en-US" dirty="0"/>
+                        <a:t>Format specifier</a:t>
+                      </a:r>
+                    </a:p>
+                  </a:txBody>
+                  <a:tcPr/>
+                </a:tc>
+                <a:tc>
+                  <a:txBody>
+                    <a:bodyPr/>
+                    <a:lstStyle/>
+                    <a:p>
+                      <a:r>
+                        <a:rPr lang="en-US" dirty="0"/>
+                        <a:t>Description</a:t>
+                      </a:r>
+                    </a:p>
+                  </a:txBody>
+                  <a:tcPr/>
+                </a:tc>
+                <a:extLst>
+                  <a:ext uri="{0D108BD9-81ED-4DB2-BD59-A6C34878D82A}">
+                    <a16:rowId xmlns:a16="http://schemas.microsoft.com/office/drawing/2014/main" val="3297501512"/>
+                  </a:ext>
+                </a:extLst>
+              </a:tr>
+              <a:tr h="507160">
+                <a:tc>
+                  <a:txBody>
+                    <a:bodyPr/>
+                    <a:lstStyle/>
+                    <a:p>
+                      <a:r>
+                        <a:rPr lang="en-US" dirty="0"/>
+                        <a:t>N or n</a:t>
+                      </a:r>
+                    </a:p>
+                  </a:txBody>
+                  <a:tcPr/>
+                </a:tc>
+                <a:tc>
+                  <a:txBody>
+                    <a:bodyPr/>
+                    <a:lstStyle/>
+                    <a:p>
+                      <a:r>
+                        <a:rPr lang="en-US" dirty="0"/>
+                        <a:t>Adds a thousands separator, displays 2 decimal places (by default)</a:t>
+                      </a:r>
+                    </a:p>
+                  </a:txBody>
+                  <a:tcPr/>
+                </a:tc>
+                <a:extLst>
+                  <a:ext uri="{0D108BD9-81ED-4DB2-BD59-A6C34878D82A}">
+                    <a16:rowId xmlns:a16="http://schemas.microsoft.com/office/drawing/2014/main" val="4284607616"/>
+                  </a:ext>
+                </a:extLst>
+              </a:tr>
+              <a:tr h="507160">
+                <a:tc>
+                  <a:txBody>
+                    <a:bodyPr/>
+                    <a:lstStyle/>
+                    <a:p>
+                      <a:r>
+                        <a:rPr lang="en-US" dirty="0"/>
+                        <a:t>E or e</a:t>
+                      </a:r>
+                    </a:p>
+                  </a:txBody>
+                  <a:tcPr/>
+                </a:tc>
+                <a:tc>
+                  <a:txBody>
+                    <a:bodyPr/>
+                    <a:lstStyle/>
+                    <a:p>
+                      <a:r>
+                        <a:rPr lang="en-US" dirty="0"/>
+                        <a:t>Uses scientific notation, displays 6 decimal places</a:t>
+                      </a:r>
+                    </a:p>
+                  </a:txBody>
+                  <a:tcPr/>
+                </a:tc>
+                <a:extLst>
+                  <a:ext uri="{0D108BD9-81ED-4DB2-BD59-A6C34878D82A}">
+                    <a16:rowId xmlns:a16="http://schemas.microsoft.com/office/drawing/2014/main" val="682164890"/>
+                  </a:ext>
+                </a:extLst>
+              </a:tr>
+              <a:tr h="507160">
+                <a:tc>
+                  <a:txBody>
+                    <a:bodyPr/>
+                    <a:lstStyle/>
+                    <a:p>
+                      <a:r>
+                        <a:rPr lang="en-US" dirty="0"/>
+                        <a:t>C or c</a:t>
+                      </a:r>
+                    </a:p>
+                  </a:txBody>
+                  <a:tcPr/>
+                </a:tc>
+                <a:tc>
+                  <a:txBody>
+                    <a:bodyPr/>
+                    <a:lstStyle/>
+                    <a:p>
+                      <a:r>
+                        <a:rPr lang="en-US" dirty="0"/>
+                        <a:t>Formats as currency: Adds a currency symbol, adds thousands separator, displays 2 decimal places</a:t>
+                      </a:r>
+                    </a:p>
+                  </a:txBody>
+                  <a:tcPr/>
+                </a:tc>
+                <a:extLst>
+                  <a:ext uri="{0D108BD9-81ED-4DB2-BD59-A6C34878D82A}">
+                    <a16:rowId xmlns:a16="http://schemas.microsoft.com/office/drawing/2014/main" val="1887232300"/>
+                  </a:ext>
+                </a:extLst>
+              </a:tr>
+              <a:tr h="507160">
+                <a:tc>
+                  <a:txBody>
+                    <a:bodyPr/>
+                    <a:lstStyle/>
+                    <a:p>
+                      <a:r>
+                        <a:rPr lang="en-US" dirty="0"/>
+                        <a:t>P or p</a:t>
+                      </a:r>
+                    </a:p>
+                  </a:txBody>
+                  <a:tcPr/>
+                </a:tc>
+                <a:tc>
+                  <a:txBody>
+                    <a:bodyPr/>
+                    <a:lstStyle/>
+                    <a:p>
+                      <a:r>
+                        <a:rPr lang="en-US" dirty="0"/>
+                        <a:t>Formats as percentage with 2 decimal places</a:t>
+                      </a:r>
+                    </a:p>
+                  </a:txBody>
+                  <a:tcPr/>
+                </a:tc>
+                <a:extLst>
+                  <a:ext uri="{0D108BD9-81ED-4DB2-BD59-A6C34878D82A}">
+                    <a16:rowId xmlns:a16="http://schemas.microsoft.com/office/drawing/2014/main" val="2305914161"/>
+                  </a:ext>
+                </a:extLst>
+              </a:tr>
+            </a:tbl>
+          </a:graphicData>
+        </a:graphic>
+      </p:graphicFrame>
+    </p:spTree>
+    <p:extLst>
+      <p:ext uri="{BB962C8B-B14F-4D97-AF65-F5344CB8AC3E}">
+        <p14:creationId xmlns:p14="http://schemas.microsoft.com/office/powerpoint/2010/main" val="4148294812"/>
+      </p:ext>
+    </p:extLst>
+  </p:cSld>
+  <p:clrMapOvr>
+    <a:masterClrMapping/>
+  </p:clrMapOvr>
+</p:sld>
+</file>
+
+<file path=ppt/slides/slide19.xml><?xml version="1.0" encoding="utf-8"?>
+<p:sld xmlns:a="http://schemas.openxmlformats.org/drawingml/2006/main" xmlns:r="http://schemas.openxmlformats.org/officeDocument/2006/relationships" xmlns:p="http://schemas.openxmlformats.org/presentationml/2006/main">
+  <p:cSld>
+    <p:spTree>
+      <p:nvGrpSpPr>
+        <p:cNvPr id="1" name=""/>
+        <p:cNvGrpSpPr/>
+        <p:nvPr/>
+      </p:nvGrpSpPr>
+      <p:grpSpPr>
+        <a:xfrm>
+          <a:off x="0" y="0"/>
+          <a:ext cx="0" cy="0"/>
+          <a:chOff x="0" y="0"/>
+          <a:chExt cx="0" cy="0"/>
+        </a:xfrm>
+      </p:grpSpPr>
+      <p:sp>
+        <p:nvSpPr>
+          <p:cNvPr id="2" name="Title 1">
+            <a:extLst>
+              <a:ext uri="{FF2B5EF4-FFF2-40B4-BE49-F238E27FC236}">
+                <a16:creationId xmlns:a16="http://schemas.microsoft.com/office/drawing/2014/main" id="{C4D0A112-D9F4-4484-B430-4543368BC4F4}"/>
+              </a:ext>
+            </a:extLst>
+          </p:cNvPr>
+          <p:cNvSpPr>
+            <a:spLocks noGrp="1"/>
+          </p:cNvSpPr>
+          <p:nvPr>
+            <p:ph type="title"/>
+          </p:nvPr>
+        </p:nvSpPr>
+        <p:spPr/>
+        <p:txBody>
+          <a:bodyPr/>
+          <a:lstStyle/>
+          <a:p>
+            <a:r>
+              <a:rPr lang="en-US" dirty="0"/>
+              <a:t>Format Specifier Example</a:t>
+            </a:r>
+          </a:p>
+        </p:txBody>
+      </p:sp>
+      <p:sp>
+        <p:nvSpPr>
+          <p:cNvPr id="3" name="Content Placeholder 2">
+            <a:extLst>
+              <a:ext uri="{FF2B5EF4-FFF2-40B4-BE49-F238E27FC236}">
+                <a16:creationId xmlns:a16="http://schemas.microsoft.com/office/drawing/2014/main" id="{A8EE9B6A-78A7-4540-8E18-B9F20A4B49FC}"/>
+              </a:ext>
+            </a:extLst>
+          </p:cNvPr>
+          <p:cNvSpPr>
+            <a:spLocks noGrp="1"/>
+          </p:cNvSpPr>
+          <p:nvPr>
+            <p:ph idx="1"/>
+          </p:nvPr>
+        </p:nvSpPr>
+        <p:spPr/>
+        <p:txBody>
+          <a:bodyPr/>
+          <a:lstStyle/>
+          <a:p>
+            <a:r>
+              <a:rPr lang="en-US" dirty="0"/>
+              <a:t>Returning to the sale price:</a:t>
+            </a:r>
+          </a:p>
+        </p:txBody>
+      </p:sp>
+      <p:sp>
+        <p:nvSpPr>
+          <p:cNvPr id="4" name="Footer Placeholder 3">
+            <a:extLst>
+              <a:ext uri="{FF2B5EF4-FFF2-40B4-BE49-F238E27FC236}">
+                <a16:creationId xmlns:a16="http://schemas.microsoft.com/office/drawing/2014/main" id="{987D1221-1575-42DF-A5EE-63011D85F1B0}"/>
+              </a:ext>
+            </a:extLst>
+          </p:cNvPr>
+          <p:cNvSpPr>
+            <a:spLocks noGrp="1"/>
+          </p:cNvSpPr>
+          <p:nvPr>
+            <p:ph type="ftr" sz="quarter" idx="11"/>
+          </p:nvPr>
+        </p:nvSpPr>
+        <p:spPr/>
+        <p:txBody>
+          <a:bodyPr/>
+          <a:lstStyle/>
+          <a:p>
+            <a:r>
+              <a:rPr lang="en-US"/>
+              <a:t>CSCI 1301</a:t>
+            </a:r>
+          </a:p>
+        </p:txBody>
+      </p:sp>
+      <p:sp>
+        <p:nvSpPr>
+          <p:cNvPr id="5" name="TextBox 4">
+            <a:extLst>
+              <a:ext uri="{FF2B5EF4-FFF2-40B4-BE49-F238E27FC236}">
+                <a16:creationId xmlns:a16="http://schemas.microsoft.com/office/drawing/2014/main" id="{0249A65A-9264-4E59-AEC6-1102A4075C77}"/>
+              </a:ext>
+            </a:extLst>
+          </p:cNvPr>
+          <p:cNvSpPr txBox="1"/>
+          <p:nvPr/>
+        </p:nvSpPr>
+        <p:spPr>
+          <a:xfrm>
+            <a:off x="2093912" y="2362200"/>
+            <a:ext cx="8191500" cy="1981953"/>
+          </a:xfrm>
+          <a:prstGeom prst="rect">
+            <a:avLst/>
+          </a:prstGeom>
+          <a:solidFill>
+            <a:schemeClr val="bg1">
+              <a:lumMod val="85000"/>
+              <a:lumOff val="15000"/>
+            </a:schemeClr>
+          </a:solidFill>
+        </p:spPr>
+        <p:txBody>
+          <a:bodyPr wrap="square" rtlCol="0">
+            <a:spAutoFit/>
+          </a:bodyPr>
+          <a:lstStyle>
+            <a:defPPr>
+              <a:defRPr lang="en-US"/>
+            </a:defPPr>
+            <a:lvl1pPr>
+              <a:defRPr sz="2200">
+                <a:solidFill>
+                  <a:srgbClr val="0099FF"/>
+                </a:solidFill>
+                <a:latin typeface="Consolas" panose="020B0609020204030204" pitchFamily="49" charset="0"/>
+              </a:defRPr>
+            </a:lvl1pPr>
+          </a:lstStyle>
+          <a:p>
+            <a:pPr>
+              <a:lnSpc>
+                <a:spcPct val="113000"/>
+              </a:lnSpc>
+            </a:pPr>
+            <a:r>
+              <a:rPr lang="en-US" dirty="0"/>
+              <a:t>decimal</a:t>
+            </a:r>
+            <a:r>
+              <a:rPr lang="en-US" dirty="0">
+                <a:solidFill>
+                  <a:schemeClr val="tx1"/>
+                </a:solidFill>
+              </a:rPr>
+              <a:t> price = </a:t>
+            </a:r>
+            <a:r>
+              <a:rPr lang="en-US" dirty="0">
+                <a:solidFill>
+                  <a:srgbClr val="99CC00"/>
+                </a:solidFill>
+              </a:rPr>
+              <a:t>19.99m</a:t>
+            </a:r>
+            <a:r>
+              <a:rPr lang="en-US" dirty="0">
+                <a:solidFill>
+                  <a:schemeClr val="tx1"/>
+                </a:solidFill>
+              </a:rPr>
+              <a:t>;</a:t>
+            </a:r>
+          </a:p>
+          <a:p>
+            <a:pPr>
+              <a:lnSpc>
+                <a:spcPct val="113000"/>
+              </a:lnSpc>
+            </a:pPr>
+            <a:r>
+              <a:rPr lang="en-US" dirty="0"/>
+              <a:t>decimal</a:t>
+            </a:r>
+            <a:r>
+              <a:rPr lang="en-US" dirty="0">
+                <a:solidFill>
+                  <a:schemeClr val="tx1"/>
+                </a:solidFill>
+              </a:rPr>
+              <a:t> discount = </a:t>
+            </a:r>
+            <a:r>
+              <a:rPr lang="en-US" dirty="0">
+                <a:solidFill>
+                  <a:srgbClr val="99CC00"/>
+                </a:solidFill>
+              </a:rPr>
+              <a:t>0.25m</a:t>
+            </a:r>
+            <a:r>
+              <a:rPr lang="en-US" dirty="0">
+                <a:solidFill>
+                  <a:schemeClr val="tx1"/>
+                </a:solidFill>
+              </a:rPr>
+              <a:t>;</a:t>
+            </a:r>
+          </a:p>
+          <a:p>
+            <a:pPr>
+              <a:lnSpc>
+                <a:spcPct val="113000"/>
+              </a:lnSpc>
+            </a:pPr>
+            <a:r>
+              <a:rPr lang="en-US" dirty="0"/>
+              <a:t>decimal</a:t>
+            </a:r>
+            <a:r>
+              <a:rPr lang="en-US" dirty="0">
+                <a:solidFill>
+                  <a:schemeClr val="tx1"/>
+                </a:solidFill>
+              </a:rPr>
+              <a:t> </a:t>
+            </a:r>
+            <a:r>
+              <a:rPr lang="en-US" dirty="0" err="1">
+                <a:solidFill>
+                  <a:schemeClr val="tx1"/>
+                </a:solidFill>
+              </a:rPr>
+              <a:t>salePrice</a:t>
+            </a:r>
+            <a:r>
+              <a:rPr lang="en-US" dirty="0">
+                <a:solidFill>
+                  <a:schemeClr val="tx1"/>
+                </a:solidFill>
+              </a:rPr>
+              <a:t> = price – discount * price;</a:t>
+            </a:r>
+          </a:p>
+          <a:p>
+            <a:pPr>
+              <a:lnSpc>
+                <a:spcPct val="113000"/>
+              </a:lnSpc>
+            </a:pPr>
+            <a:r>
+              <a:rPr lang="en-US" dirty="0" err="1">
+                <a:solidFill>
+                  <a:srgbClr val="66FFCC"/>
+                </a:solidFill>
+              </a:rPr>
+              <a:t>Console</a:t>
+            </a:r>
+            <a:r>
+              <a:rPr lang="en-US" dirty="0" err="1">
+                <a:solidFill>
+                  <a:schemeClr val="tx1"/>
+                </a:solidFill>
+              </a:rPr>
+              <a:t>.</a:t>
+            </a:r>
+            <a:r>
+              <a:rPr lang="en-US" dirty="0" err="1">
+                <a:solidFill>
+                  <a:srgbClr val="CC9900"/>
+                </a:solidFill>
+              </a:rPr>
+              <a:t>WriteLine</a:t>
+            </a:r>
+            <a:r>
+              <a:rPr lang="en-US" dirty="0">
+                <a:solidFill>
+                  <a:schemeClr val="tx1"/>
+                </a:solidFill>
+              </a:rPr>
+              <a:t>(</a:t>
+            </a:r>
+            <a:r>
+              <a:rPr lang="en-US" dirty="0">
+                <a:solidFill>
+                  <a:srgbClr val="FF5050"/>
+                </a:solidFill>
+              </a:rPr>
+              <a:t>$"</a:t>
+            </a:r>
+            <a:r>
+              <a:rPr lang="en-US" dirty="0">
+                <a:solidFill>
+                  <a:srgbClr val="99CCFF"/>
+                </a:solidFill>
+              </a:rPr>
+              <a:t>{</a:t>
+            </a:r>
+            <a:r>
+              <a:rPr lang="en-US" dirty="0" err="1">
+                <a:solidFill>
+                  <a:srgbClr val="99CCFF"/>
+                </a:solidFill>
+              </a:rPr>
+              <a:t>price:C</a:t>
+            </a:r>
+            <a:r>
+              <a:rPr lang="en-US" dirty="0">
+                <a:solidFill>
+                  <a:srgbClr val="99CCFF"/>
+                </a:solidFill>
+              </a:rPr>
+              <a:t>}</a:t>
+            </a:r>
+            <a:r>
+              <a:rPr lang="en-US" dirty="0">
+                <a:solidFill>
+                  <a:srgbClr val="FF5050"/>
+                </a:solidFill>
+              </a:rPr>
+              <a:t> with a discount of " </a:t>
+            </a:r>
+            <a:r>
+              <a:rPr lang="en-US" dirty="0">
+                <a:solidFill>
+                  <a:schemeClr val="tx1"/>
+                </a:solidFill>
+              </a:rPr>
+              <a:t>+</a:t>
+            </a:r>
+          </a:p>
+          <a:p>
+            <a:pPr>
+              <a:lnSpc>
+                <a:spcPct val="113000"/>
+              </a:lnSpc>
+            </a:pPr>
+            <a:r>
+              <a:rPr lang="en-US" dirty="0">
+                <a:solidFill>
+                  <a:srgbClr val="FF5050"/>
+                </a:solidFill>
+              </a:rPr>
+              <a:t>      $"</a:t>
+            </a:r>
+            <a:r>
+              <a:rPr lang="en-US" dirty="0">
+                <a:solidFill>
+                  <a:srgbClr val="99CCFF"/>
+                </a:solidFill>
+              </a:rPr>
+              <a:t>{</a:t>
+            </a:r>
+            <a:r>
+              <a:rPr lang="en-US" dirty="0" err="1">
+                <a:solidFill>
+                  <a:srgbClr val="99CCFF"/>
+                </a:solidFill>
+              </a:rPr>
+              <a:t>discount:P</a:t>
+            </a:r>
+            <a:r>
+              <a:rPr lang="en-US" dirty="0">
+                <a:solidFill>
+                  <a:srgbClr val="99CCFF"/>
+                </a:solidFill>
+              </a:rPr>
+              <a:t>}</a:t>
+            </a:r>
+            <a:r>
+              <a:rPr lang="en-US" dirty="0">
+                <a:solidFill>
+                  <a:srgbClr val="FF5050"/>
+                </a:solidFill>
+              </a:rPr>
+              <a:t> is </a:t>
+            </a:r>
+            <a:r>
+              <a:rPr lang="en-US" dirty="0">
+                <a:solidFill>
+                  <a:srgbClr val="99CCFF"/>
+                </a:solidFill>
+              </a:rPr>
+              <a:t>{</a:t>
+            </a:r>
+            <a:r>
+              <a:rPr lang="en-US" dirty="0" err="1">
+                <a:solidFill>
+                  <a:srgbClr val="99CCFF"/>
+                </a:solidFill>
+              </a:rPr>
+              <a:t>salePrice:C</a:t>
+            </a:r>
+            <a:r>
+              <a:rPr lang="en-US" dirty="0">
+                <a:solidFill>
+                  <a:srgbClr val="99CCFF"/>
+                </a:solidFill>
+              </a:rPr>
+              <a:t>}</a:t>
+            </a:r>
+            <a:r>
+              <a:rPr lang="en-US" dirty="0">
+                <a:solidFill>
+                  <a:srgbClr val="FF5050"/>
+                </a:solidFill>
+              </a:rPr>
+              <a:t>"</a:t>
+            </a:r>
+            <a:r>
+              <a:rPr lang="en-US" dirty="0">
+                <a:solidFill>
+                  <a:schemeClr val="tx1"/>
+                </a:solidFill>
+              </a:rPr>
+              <a:t>);</a:t>
+            </a:r>
+          </a:p>
+        </p:txBody>
+      </p:sp>
+      <p:sp>
+        <p:nvSpPr>
+          <p:cNvPr id="6" name="Rectangle 5">
+            <a:extLst>
+              <a:ext uri="{FF2B5EF4-FFF2-40B4-BE49-F238E27FC236}">
+                <a16:creationId xmlns:a16="http://schemas.microsoft.com/office/drawing/2014/main" id="{6F2B5CE6-EE31-4229-95EA-5999CB034178}"/>
+              </a:ext>
+            </a:extLst>
+          </p:cNvPr>
+          <p:cNvSpPr/>
+          <p:nvPr/>
+        </p:nvSpPr>
+        <p:spPr>
+          <a:xfrm>
+            <a:off x="2417762" y="5099010"/>
+            <a:ext cx="7353300" cy="837448"/>
+          </a:xfrm>
+          <a:prstGeom prst="rect">
+            <a:avLst/>
+          </a:prstGeom>
+          <a:solidFill>
+            <a:schemeClr val="bg1">
+              <a:lumMod val="85000"/>
+              <a:lumOff val="15000"/>
+            </a:schemeClr>
+          </a:solidFill>
+          <a:ln>
+            <a:solidFill>
+              <a:schemeClr val="bg1"/>
+            </a:solidFill>
+          </a:ln>
+        </p:spPr>
+        <p:style>
+          <a:lnRef idx="2">
+            <a:schemeClr val="accent1">
+              <a:shade val="50000"/>
+            </a:schemeClr>
+          </a:lnRef>
+          <a:fillRef idx="1">
+            <a:schemeClr val="accent1"/>
+          </a:fillRef>
+          <a:effectRef idx="0">
+            <a:schemeClr val="accent1"/>
+          </a:effectRef>
+          <a:fontRef idx="minor">
+            <a:schemeClr val="lt1"/>
+          </a:fontRef>
+        </p:style>
+        <p:txBody>
+          <a:bodyPr rtlCol="0" anchor="t"/>
+          <a:lstStyle/>
+          <a:p>
+            <a:r>
+              <a:rPr lang="en-US" dirty="0">
+                <a:latin typeface="Consolas" panose="020B0609020204030204" pitchFamily="49" charset="0"/>
+              </a:rPr>
+              <a:t>$19.99 with a discount of 25.00% is $14.99</a:t>
+            </a:r>
+          </a:p>
+        </p:txBody>
+      </p:sp>
+      <p:sp>
+        <p:nvSpPr>
+          <p:cNvPr id="7" name="Arrow: Down 6">
+            <a:extLst>
+              <a:ext uri="{FF2B5EF4-FFF2-40B4-BE49-F238E27FC236}">
+                <a16:creationId xmlns:a16="http://schemas.microsoft.com/office/drawing/2014/main" id="{5F393069-E7F5-4F53-9B8B-8BB74B947F87}"/>
+              </a:ext>
+            </a:extLst>
+          </p:cNvPr>
+          <p:cNvSpPr/>
+          <p:nvPr/>
+        </p:nvSpPr>
+        <p:spPr>
+          <a:xfrm>
+            <a:off x="5865812" y="4419600"/>
+            <a:ext cx="457200" cy="533400"/>
+          </a:xfrm>
+          <a:prstGeom prst="downArrow">
+            <a:avLst/>
+          </a:prstGeom>
+        </p:spPr>
+        <p:style>
+          <a:lnRef idx="2">
+            <a:schemeClr val="accent1">
+              <a:shade val="50000"/>
+            </a:schemeClr>
+          </a:lnRef>
+          <a:fillRef idx="1">
+            <a:schemeClr val="accent1"/>
+          </a:fillRef>
+          <a:effectRef idx="0">
+            <a:schemeClr val="accent1"/>
+          </a:effectRef>
+          <a:fontRef idx="minor">
+            <a:schemeClr val="lt1"/>
+          </a:fontRef>
+        </p:style>
+        <p:txBody>
+          <a:bodyPr rtlCol="0" anchor="ctr"/>
+          <a:lstStyle/>
+          <a:p>
+            <a:pPr algn="ctr"/>
+            <a:endParaRPr lang="en-US"/>
+          </a:p>
+        </p:txBody>
+      </p:sp>
+    </p:spTree>
+    <p:extLst>
+      <p:ext uri="{BB962C8B-B14F-4D97-AF65-F5344CB8AC3E}">
+        <p14:creationId xmlns:p14="http://schemas.microsoft.com/office/powerpoint/2010/main" val="3604931116"/>
       </p:ext>
     </p:extLst>
   </p:cSld>
@@ -10530,6 +12112,12 @@
               <a:t>Displaying</a:t>
             </a:r>
           </a:p>
+          <a:p>
+            <a:r>
+              <a:rPr lang="en-US" dirty="0"/>
+              <a:t>Format Specifiers</a:t>
+            </a:r>
+          </a:p>
         </p:txBody>
       </p:sp>
       <p:sp>
@@ -10558,6 +12146,1004 @@
     <p:extLst>
       <p:ext uri="{BB962C8B-B14F-4D97-AF65-F5344CB8AC3E}">
         <p14:creationId xmlns:p14="http://schemas.microsoft.com/office/powerpoint/2010/main" val="2425262121"/>
+      </p:ext>
+    </p:extLst>
+  </p:cSld>
+  <p:clrMapOvr>
+    <a:masterClrMapping/>
+  </p:clrMapOvr>
+</p:sld>
+</file>
+
+<file path=ppt/slides/slide20.xml><?xml version="1.0" encoding="utf-8"?>
+<p:sld xmlns:a="http://schemas.openxmlformats.org/drawingml/2006/main" xmlns:r="http://schemas.openxmlformats.org/officeDocument/2006/relationships" xmlns:p="http://schemas.openxmlformats.org/presentationml/2006/main">
+  <p:cSld>
+    <p:spTree>
+      <p:nvGrpSpPr>
+        <p:cNvPr id="1" name=""/>
+        <p:cNvGrpSpPr/>
+        <p:nvPr/>
+      </p:nvGrpSpPr>
+      <p:grpSpPr>
+        <a:xfrm>
+          <a:off x="0" y="0"/>
+          <a:ext cx="0" cy="0"/>
+          <a:chOff x="0" y="0"/>
+          <a:chExt cx="0" cy="0"/>
+        </a:xfrm>
+      </p:grpSpPr>
+      <p:sp>
+        <p:nvSpPr>
+          <p:cNvPr id="2" name="Title 1">
+            <a:extLst>
+              <a:ext uri="{FF2B5EF4-FFF2-40B4-BE49-F238E27FC236}">
+                <a16:creationId xmlns:a16="http://schemas.microsoft.com/office/drawing/2014/main" id="{ED547ACC-F6FE-4822-A4DD-E4400A6B8D57}"/>
+              </a:ext>
+            </a:extLst>
+          </p:cNvPr>
+          <p:cNvSpPr>
+            <a:spLocks noGrp="1"/>
+          </p:cNvSpPr>
+          <p:nvPr>
+            <p:ph type="title"/>
+          </p:nvPr>
+        </p:nvSpPr>
+        <p:spPr/>
+        <p:txBody>
+          <a:bodyPr/>
+          <a:lstStyle/>
+          <a:p>
+            <a:r>
+              <a:rPr lang="en-US" dirty="0"/>
+              <a:t>Formats with Rounding</a:t>
+            </a:r>
+          </a:p>
+        </p:txBody>
+      </p:sp>
+      <p:sp>
+        <p:nvSpPr>
+          <p:cNvPr id="3" name="Content Placeholder 2">
+            <a:extLst>
+              <a:ext uri="{FF2B5EF4-FFF2-40B4-BE49-F238E27FC236}">
+                <a16:creationId xmlns:a16="http://schemas.microsoft.com/office/drawing/2014/main" id="{457F27E5-F19C-4F76-A351-E6A0814A70E0}"/>
+              </a:ext>
+            </a:extLst>
+          </p:cNvPr>
+          <p:cNvSpPr>
+            <a:spLocks noGrp="1"/>
+          </p:cNvSpPr>
+          <p:nvPr>
+            <p:ph idx="1"/>
+          </p:nvPr>
+        </p:nvSpPr>
+        <p:spPr/>
+        <p:txBody>
+          <a:bodyPr/>
+          <a:lstStyle/>
+          <a:p>
+            <a:r>
+              <a:rPr lang="en-US" dirty="0"/>
+              <a:t>For each format, can change the number of decimal places by adding </a:t>
+            </a:r>
+            <a:r>
+              <a:rPr lang="en-US" b="1" dirty="0"/>
+              <a:t>precision specifier</a:t>
+            </a:r>
+            <a:r>
+              <a:rPr lang="en-US" dirty="0"/>
+              <a:t>: </a:t>
+            </a:r>
+            <a:r>
+              <a:rPr lang="en-US" dirty="0">
+                <a:latin typeface="Consolas" panose="020B0609020204030204" pitchFamily="49" charset="0"/>
+              </a:rPr>
+              <a:t>{numVar:N3}</a:t>
+            </a:r>
+          </a:p>
+        </p:txBody>
+      </p:sp>
+      <p:sp>
+        <p:nvSpPr>
+          <p:cNvPr id="4" name="Footer Placeholder 3">
+            <a:extLst>
+              <a:ext uri="{FF2B5EF4-FFF2-40B4-BE49-F238E27FC236}">
+                <a16:creationId xmlns:a16="http://schemas.microsoft.com/office/drawing/2014/main" id="{32761632-AE58-4A08-A45D-35A26EAECA44}"/>
+              </a:ext>
+            </a:extLst>
+          </p:cNvPr>
+          <p:cNvSpPr>
+            <a:spLocks noGrp="1"/>
+          </p:cNvSpPr>
+          <p:nvPr>
+            <p:ph type="ftr" sz="quarter" idx="11"/>
+          </p:nvPr>
+        </p:nvSpPr>
+        <p:spPr/>
+        <p:txBody>
+          <a:bodyPr/>
+          <a:lstStyle/>
+          <a:p>
+            <a:r>
+              <a:rPr lang="en-US"/>
+              <a:t>CSCI 1301</a:t>
+            </a:r>
+          </a:p>
+        </p:txBody>
+      </p:sp>
+      <p:sp>
+        <p:nvSpPr>
+          <p:cNvPr id="5" name="TextBox 4">
+            <a:extLst>
+              <a:ext uri="{FF2B5EF4-FFF2-40B4-BE49-F238E27FC236}">
+                <a16:creationId xmlns:a16="http://schemas.microsoft.com/office/drawing/2014/main" id="{280E5D7D-9E30-42F2-9DD7-6C02622E8057}"/>
+              </a:ext>
+            </a:extLst>
+          </p:cNvPr>
+          <p:cNvSpPr txBox="1"/>
+          <p:nvPr/>
+        </p:nvSpPr>
+        <p:spPr>
+          <a:xfrm>
+            <a:off x="3786863" y="2514600"/>
+            <a:ext cx="2042547" cy="461665"/>
+          </a:xfrm>
+          <a:prstGeom prst="rect">
+            <a:avLst/>
+          </a:prstGeom>
+          <a:noFill/>
+        </p:spPr>
+        <p:txBody>
+          <a:bodyPr wrap="none" rtlCol="0">
+            <a:spAutoFit/>
+          </a:bodyPr>
+          <a:lstStyle/>
+          <a:p>
+            <a:r>
+              <a:rPr lang="en-US" dirty="0"/>
+              <a:t>Numeric value</a:t>
+            </a:r>
+          </a:p>
+        </p:txBody>
+      </p:sp>
+      <p:cxnSp>
+        <p:nvCxnSpPr>
+          <p:cNvPr id="6" name="Straight Arrow Connector 5">
+            <a:extLst>
+              <a:ext uri="{FF2B5EF4-FFF2-40B4-BE49-F238E27FC236}">
+                <a16:creationId xmlns:a16="http://schemas.microsoft.com/office/drawing/2014/main" id="{7782A64A-B0FA-4904-AC94-B5E4F98851EA}"/>
+              </a:ext>
+            </a:extLst>
+          </p:cNvPr>
+          <p:cNvCxnSpPr>
+            <a:cxnSpLocks/>
+          </p:cNvCxnSpPr>
+          <p:nvPr/>
+        </p:nvCxnSpPr>
+        <p:spPr>
+          <a:xfrm flipV="1">
+            <a:off x="7084642" y="2340544"/>
+            <a:ext cx="246402" cy="352343"/>
+          </a:xfrm>
+          <a:prstGeom prst="straightConnector1">
+            <a:avLst/>
+          </a:prstGeom>
+          <a:ln>
+            <a:tailEnd type="triangle"/>
+          </a:ln>
+        </p:spPr>
+        <p:style>
+          <a:lnRef idx="2">
+            <a:schemeClr val="accent6"/>
+          </a:lnRef>
+          <a:fillRef idx="0">
+            <a:schemeClr val="accent6"/>
+          </a:fillRef>
+          <a:effectRef idx="1">
+            <a:schemeClr val="accent6"/>
+          </a:effectRef>
+          <a:fontRef idx="minor">
+            <a:schemeClr val="tx1"/>
+          </a:fontRef>
+        </p:style>
+      </p:cxnSp>
+      <p:cxnSp>
+        <p:nvCxnSpPr>
+          <p:cNvPr id="7" name="Straight Arrow Connector 6">
+            <a:extLst>
+              <a:ext uri="{FF2B5EF4-FFF2-40B4-BE49-F238E27FC236}">
+                <a16:creationId xmlns:a16="http://schemas.microsoft.com/office/drawing/2014/main" id="{EA268FB2-0ECB-493D-847B-BA5333DD94A1}"/>
+              </a:ext>
+            </a:extLst>
+          </p:cNvPr>
+          <p:cNvCxnSpPr>
+            <a:cxnSpLocks/>
+          </p:cNvCxnSpPr>
+          <p:nvPr/>
+        </p:nvCxnSpPr>
+        <p:spPr>
+          <a:xfrm flipV="1">
+            <a:off x="5780208" y="2365119"/>
+            <a:ext cx="372202" cy="321430"/>
+          </a:xfrm>
+          <a:prstGeom prst="straightConnector1">
+            <a:avLst/>
+          </a:prstGeom>
+          <a:ln>
+            <a:tailEnd type="triangle"/>
+          </a:ln>
+        </p:spPr>
+        <p:style>
+          <a:lnRef idx="2">
+            <a:schemeClr val="accent6"/>
+          </a:lnRef>
+          <a:fillRef idx="0">
+            <a:schemeClr val="accent6"/>
+          </a:fillRef>
+          <a:effectRef idx="1">
+            <a:schemeClr val="accent6"/>
+          </a:effectRef>
+          <a:fontRef idx="minor">
+            <a:schemeClr val="tx1"/>
+          </a:fontRef>
+        </p:style>
+      </p:cxnSp>
+      <p:sp>
+        <p:nvSpPr>
+          <p:cNvPr id="8" name="TextBox 7">
+            <a:extLst>
+              <a:ext uri="{FF2B5EF4-FFF2-40B4-BE49-F238E27FC236}">
+                <a16:creationId xmlns:a16="http://schemas.microsoft.com/office/drawing/2014/main" id="{CA59EB15-80CC-4C5E-9756-6C07E7FA4406}"/>
+              </a:ext>
+            </a:extLst>
+          </p:cNvPr>
+          <p:cNvSpPr txBox="1"/>
+          <p:nvPr/>
+        </p:nvSpPr>
+        <p:spPr>
+          <a:xfrm>
+            <a:off x="6408617" y="2585877"/>
+            <a:ext cx="1352049" cy="830997"/>
+          </a:xfrm>
+          <a:prstGeom prst="rect">
+            <a:avLst/>
+          </a:prstGeom>
+          <a:noFill/>
+        </p:spPr>
+        <p:txBody>
+          <a:bodyPr wrap="square" rtlCol="0">
+            <a:spAutoFit/>
+          </a:bodyPr>
+          <a:lstStyle/>
+          <a:p>
+            <a:r>
+              <a:rPr lang="en-US" dirty="0"/>
+              <a:t>Format specifier</a:t>
+            </a:r>
+          </a:p>
+        </p:txBody>
+      </p:sp>
+      <p:cxnSp>
+        <p:nvCxnSpPr>
+          <p:cNvPr id="11" name="Straight Arrow Connector 10">
+            <a:extLst>
+              <a:ext uri="{FF2B5EF4-FFF2-40B4-BE49-F238E27FC236}">
+                <a16:creationId xmlns:a16="http://schemas.microsoft.com/office/drawing/2014/main" id="{3DA39751-64E5-472B-A1EE-78EE3394FA9F}"/>
+              </a:ext>
+            </a:extLst>
+          </p:cNvPr>
+          <p:cNvCxnSpPr>
+            <a:cxnSpLocks/>
+          </p:cNvCxnSpPr>
+          <p:nvPr/>
+        </p:nvCxnSpPr>
+        <p:spPr>
+          <a:xfrm flipH="1" flipV="1">
+            <a:off x="7587251" y="2365119"/>
+            <a:ext cx="398118" cy="321430"/>
+          </a:xfrm>
+          <a:prstGeom prst="straightConnector1">
+            <a:avLst/>
+          </a:prstGeom>
+          <a:ln>
+            <a:tailEnd type="triangle"/>
+          </a:ln>
+        </p:spPr>
+        <p:style>
+          <a:lnRef idx="2">
+            <a:schemeClr val="accent6"/>
+          </a:lnRef>
+          <a:fillRef idx="0">
+            <a:schemeClr val="accent6"/>
+          </a:fillRef>
+          <a:effectRef idx="1">
+            <a:schemeClr val="accent6"/>
+          </a:effectRef>
+          <a:fontRef idx="minor">
+            <a:schemeClr val="tx1"/>
+          </a:fontRef>
+        </p:style>
+      </p:cxnSp>
+      <p:sp>
+        <p:nvSpPr>
+          <p:cNvPr id="12" name="TextBox 11">
+            <a:extLst>
+              <a:ext uri="{FF2B5EF4-FFF2-40B4-BE49-F238E27FC236}">
+                <a16:creationId xmlns:a16="http://schemas.microsoft.com/office/drawing/2014/main" id="{0EDAFE06-763E-45B1-A373-3431B1A2DAE0}"/>
+              </a:ext>
+            </a:extLst>
+          </p:cNvPr>
+          <p:cNvSpPr txBox="1"/>
+          <p:nvPr/>
+        </p:nvSpPr>
+        <p:spPr>
+          <a:xfrm>
+            <a:off x="7999412" y="2539711"/>
+            <a:ext cx="2534668" cy="461665"/>
+          </a:xfrm>
+          <a:prstGeom prst="rect">
+            <a:avLst/>
+          </a:prstGeom>
+          <a:noFill/>
+        </p:spPr>
+        <p:txBody>
+          <a:bodyPr wrap="none" rtlCol="0">
+            <a:spAutoFit/>
+          </a:bodyPr>
+          <a:lstStyle/>
+          <a:p>
+            <a:r>
+              <a:rPr lang="en-US" dirty="0"/>
+              <a:t>Precision specifier</a:t>
+            </a:r>
+          </a:p>
+        </p:txBody>
+      </p:sp>
+      <p:sp>
+        <p:nvSpPr>
+          <p:cNvPr id="16" name="TextBox 15">
+            <a:extLst>
+              <a:ext uri="{FF2B5EF4-FFF2-40B4-BE49-F238E27FC236}">
+                <a16:creationId xmlns:a16="http://schemas.microsoft.com/office/drawing/2014/main" id="{A3981F49-57CB-42C8-959E-ED67203810E4}"/>
+              </a:ext>
+            </a:extLst>
+          </p:cNvPr>
+          <p:cNvSpPr txBox="1"/>
+          <p:nvPr/>
+        </p:nvSpPr>
+        <p:spPr>
+          <a:xfrm>
+            <a:off x="899367" y="3439173"/>
+            <a:ext cx="6022707" cy="2747034"/>
+          </a:xfrm>
+          <a:prstGeom prst="rect">
+            <a:avLst/>
+          </a:prstGeom>
+          <a:solidFill>
+            <a:schemeClr val="bg1">
+              <a:lumMod val="85000"/>
+              <a:lumOff val="15000"/>
+            </a:schemeClr>
+          </a:solidFill>
+        </p:spPr>
+        <p:txBody>
+          <a:bodyPr wrap="square" rtlCol="0">
+            <a:spAutoFit/>
+          </a:bodyPr>
+          <a:lstStyle>
+            <a:defPPr>
+              <a:defRPr lang="en-US"/>
+            </a:defPPr>
+            <a:lvl1pPr>
+              <a:defRPr sz="2200">
+                <a:solidFill>
+                  <a:srgbClr val="0099FF"/>
+                </a:solidFill>
+                <a:latin typeface="Consolas" panose="020B0609020204030204" pitchFamily="49" charset="0"/>
+              </a:defRPr>
+            </a:lvl1pPr>
+          </a:lstStyle>
+          <a:p>
+            <a:pPr>
+              <a:lnSpc>
+                <a:spcPct val="113000"/>
+              </a:lnSpc>
+            </a:pPr>
+            <a:r>
+              <a:rPr lang="en-US" dirty="0"/>
+              <a:t>double</a:t>
+            </a:r>
+            <a:r>
+              <a:rPr lang="en-US" dirty="0">
+                <a:solidFill>
+                  <a:schemeClr val="tx1"/>
+                </a:solidFill>
+              </a:rPr>
+              <a:t> </a:t>
+            </a:r>
+            <a:r>
+              <a:rPr lang="en-US" dirty="0" err="1">
+                <a:solidFill>
+                  <a:schemeClr val="tx1"/>
+                </a:solidFill>
+              </a:rPr>
+              <a:t>bigNumber</a:t>
+            </a:r>
+            <a:r>
+              <a:rPr lang="en-US" dirty="0">
+                <a:solidFill>
+                  <a:schemeClr val="tx1"/>
+                </a:solidFill>
+              </a:rPr>
+              <a:t> = </a:t>
+            </a:r>
+            <a:r>
+              <a:rPr lang="en-US" dirty="0">
+                <a:solidFill>
+                  <a:srgbClr val="99CC00"/>
+                </a:solidFill>
+              </a:rPr>
+              <a:t>1537963.666</a:t>
+            </a:r>
+            <a:r>
+              <a:rPr lang="en-US" dirty="0">
+                <a:solidFill>
+                  <a:schemeClr val="tx1"/>
+                </a:solidFill>
+              </a:rPr>
+              <a:t>;</a:t>
+            </a:r>
+          </a:p>
+          <a:p>
+            <a:pPr>
+              <a:lnSpc>
+                <a:spcPct val="113000"/>
+              </a:lnSpc>
+            </a:pPr>
+            <a:r>
+              <a:rPr lang="en-US" dirty="0"/>
+              <a:t>decimal</a:t>
+            </a:r>
+            <a:r>
+              <a:rPr lang="en-US" dirty="0">
+                <a:solidFill>
+                  <a:schemeClr val="tx1"/>
+                </a:solidFill>
+              </a:rPr>
+              <a:t> discount = </a:t>
+            </a:r>
+            <a:r>
+              <a:rPr lang="en-US" dirty="0">
+                <a:solidFill>
+                  <a:srgbClr val="99CC00"/>
+                </a:solidFill>
+              </a:rPr>
+              <a:t>0.1337m</a:t>
+            </a:r>
+            <a:r>
+              <a:rPr lang="en-US" dirty="0">
+                <a:solidFill>
+                  <a:schemeClr val="tx1"/>
+                </a:solidFill>
+              </a:rPr>
+              <a:t>;</a:t>
+            </a:r>
+          </a:p>
+          <a:p>
+            <a:pPr>
+              <a:lnSpc>
+                <a:spcPct val="113000"/>
+              </a:lnSpc>
+            </a:pPr>
+            <a:r>
+              <a:rPr lang="en-US" dirty="0" err="1">
+                <a:solidFill>
+                  <a:srgbClr val="66FFCC"/>
+                </a:solidFill>
+              </a:rPr>
+              <a:t>Console</a:t>
+            </a:r>
+            <a:r>
+              <a:rPr lang="en-US" dirty="0" err="1">
+                <a:solidFill>
+                  <a:schemeClr val="tx1"/>
+                </a:solidFill>
+              </a:rPr>
+              <a:t>.</a:t>
+            </a:r>
+            <a:r>
+              <a:rPr lang="en-US" dirty="0" err="1">
+                <a:solidFill>
+                  <a:srgbClr val="CC9900"/>
+                </a:solidFill>
+              </a:rPr>
+              <a:t>WriteLine</a:t>
+            </a:r>
+            <a:r>
+              <a:rPr lang="en-US" dirty="0">
+                <a:solidFill>
+                  <a:schemeClr val="tx1"/>
+                </a:solidFill>
+              </a:rPr>
+              <a:t>(</a:t>
+            </a:r>
+            <a:r>
+              <a:rPr lang="en-US" dirty="0">
+                <a:solidFill>
+                  <a:srgbClr val="FF5050"/>
+                </a:solidFill>
+              </a:rPr>
+              <a:t>$"</a:t>
+            </a:r>
+            <a:r>
+              <a:rPr lang="en-US" dirty="0">
+                <a:solidFill>
+                  <a:srgbClr val="99CCFF"/>
+                </a:solidFill>
+              </a:rPr>
+              <a:t>{</a:t>
+            </a:r>
+            <a:r>
+              <a:rPr lang="en-US" dirty="0" err="1">
+                <a:solidFill>
+                  <a:srgbClr val="99CCFF"/>
+                </a:solidFill>
+              </a:rPr>
+              <a:t>bigNumber:N</a:t>
+            </a:r>
+            <a:r>
+              <a:rPr lang="en-US" dirty="0">
+                <a:solidFill>
+                  <a:srgbClr val="99CCFF"/>
+                </a:solidFill>
+              </a:rPr>
+              <a:t>}</a:t>
+            </a:r>
+            <a:r>
+              <a:rPr lang="en-US" dirty="0">
+                <a:solidFill>
+                  <a:srgbClr val="FF5050"/>
+                </a:solidFill>
+              </a:rPr>
+              <a:t>"</a:t>
+            </a:r>
+            <a:r>
+              <a:rPr lang="en-US" dirty="0">
+                <a:solidFill>
+                  <a:schemeClr val="tx1"/>
+                </a:solidFill>
+              </a:rPr>
+              <a:t>);</a:t>
+            </a:r>
+          </a:p>
+          <a:p>
+            <a:pPr>
+              <a:lnSpc>
+                <a:spcPct val="113000"/>
+              </a:lnSpc>
+            </a:pPr>
+            <a:r>
+              <a:rPr lang="en-US" dirty="0" err="1">
+                <a:solidFill>
+                  <a:srgbClr val="66FFCC"/>
+                </a:solidFill>
+              </a:rPr>
+              <a:t>Console</a:t>
+            </a:r>
+            <a:r>
+              <a:rPr lang="en-US" dirty="0" err="1">
+                <a:solidFill>
+                  <a:schemeClr val="tx1"/>
+                </a:solidFill>
+              </a:rPr>
+              <a:t>.</a:t>
+            </a:r>
+            <a:r>
+              <a:rPr lang="en-US" dirty="0" err="1">
+                <a:solidFill>
+                  <a:srgbClr val="CC9900"/>
+                </a:solidFill>
+              </a:rPr>
+              <a:t>WriteLine</a:t>
+            </a:r>
+            <a:r>
+              <a:rPr lang="en-US" dirty="0">
+                <a:solidFill>
+                  <a:schemeClr val="tx1"/>
+                </a:solidFill>
+              </a:rPr>
+              <a:t>(</a:t>
+            </a:r>
+            <a:r>
+              <a:rPr lang="en-US" dirty="0">
+                <a:solidFill>
+                  <a:srgbClr val="FF5050"/>
+                </a:solidFill>
+              </a:rPr>
+              <a:t>$"</a:t>
+            </a:r>
+            <a:r>
+              <a:rPr lang="en-US" dirty="0">
+                <a:solidFill>
+                  <a:srgbClr val="99CCFF"/>
+                </a:solidFill>
+              </a:rPr>
+              <a:t>{bigNumber:N3}</a:t>
+            </a:r>
+            <a:r>
+              <a:rPr lang="en-US" dirty="0">
+                <a:solidFill>
+                  <a:srgbClr val="FF5050"/>
+                </a:solidFill>
+              </a:rPr>
+              <a:t>"</a:t>
+            </a:r>
+            <a:r>
+              <a:rPr lang="en-US" dirty="0">
+                <a:solidFill>
+                  <a:schemeClr val="tx1"/>
+                </a:solidFill>
+              </a:rPr>
+              <a:t>);</a:t>
+            </a:r>
+          </a:p>
+          <a:p>
+            <a:pPr>
+              <a:lnSpc>
+                <a:spcPct val="113000"/>
+              </a:lnSpc>
+            </a:pPr>
+            <a:r>
+              <a:rPr lang="en-US" dirty="0" err="1">
+                <a:solidFill>
+                  <a:srgbClr val="66FFCC"/>
+                </a:solidFill>
+              </a:rPr>
+              <a:t>Console</a:t>
+            </a:r>
+            <a:r>
+              <a:rPr lang="en-US" dirty="0" err="1">
+                <a:solidFill>
+                  <a:schemeClr val="tx1"/>
+                </a:solidFill>
+              </a:rPr>
+              <a:t>.</a:t>
+            </a:r>
+            <a:r>
+              <a:rPr lang="en-US" dirty="0" err="1">
+                <a:solidFill>
+                  <a:srgbClr val="CC9900"/>
+                </a:solidFill>
+              </a:rPr>
+              <a:t>WriteLine</a:t>
+            </a:r>
+            <a:r>
+              <a:rPr lang="en-US" dirty="0">
+                <a:solidFill>
+                  <a:schemeClr val="tx1"/>
+                </a:solidFill>
+              </a:rPr>
+              <a:t>(</a:t>
+            </a:r>
+            <a:r>
+              <a:rPr lang="en-US" dirty="0">
+                <a:solidFill>
+                  <a:srgbClr val="FF5050"/>
+                </a:solidFill>
+              </a:rPr>
+              <a:t>$"</a:t>
+            </a:r>
+            <a:r>
+              <a:rPr lang="en-US" dirty="0">
+                <a:solidFill>
+                  <a:srgbClr val="99CCFF"/>
+                </a:solidFill>
+              </a:rPr>
+              <a:t>{bigNumber:N1}</a:t>
+            </a:r>
+            <a:r>
+              <a:rPr lang="en-US" dirty="0">
+                <a:solidFill>
+                  <a:srgbClr val="FF5050"/>
+                </a:solidFill>
+              </a:rPr>
+              <a:t>"</a:t>
+            </a:r>
+            <a:r>
+              <a:rPr lang="en-US" dirty="0">
+                <a:solidFill>
+                  <a:schemeClr val="tx1"/>
+                </a:solidFill>
+              </a:rPr>
+              <a:t>);</a:t>
+            </a:r>
+          </a:p>
+          <a:p>
+            <a:pPr>
+              <a:lnSpc>
+                <a:spcPct val="113000"/>
+              </a:lnSpc>
+            </a:pPr>
+            <a:r>
+              <a:rPr lang="en-US" dirty="0" err="1">
+                <a:solidFill>
+                  <a:srgbClr val="66FFCC"/>
+                </a:solidFill>
+              </a:rPr>
+              <a:t>Console</a:t>
+            </a:r>
+            <a:r>
+              <a:rPr lang="en-US" dirty="0" err="1">
+                <a:solidFill>
+                  <a:schemeClr val="tx1"/>
+                </a:solidFill>
+              </a:rPr>
+              <a:t>.</a:t>
+            </a:r>
+            <a:r>
+              <a:rPr lang="en-US" dirty="0" err="1">
+                <a:solidFill>
+                  <a:srgbClr val="CC9900"/>
+                </a:solidFill>
+              </a:rPr>
+              <a:t>WriteLine</a:t>
+            </a:r>
+            <a:r>
+              <a:rPr lang="en-US" dirty="0">
+                <a:solidFill>
+                  <a:schemeClr val="tx1"/>
+                </a:solidFill>
+              </a:rPr>
+              <a:t>(</a:t>
+            </a:r>
+            <a:r>
+              <a:rPr lang="en-US" dirty="0">
+                <a:solidFill>
+                  <a:srgbClr val="FF5050"/>
+                </a:solidFill>
+              </a:rPr>
+              <a:t>$"</a:t>
+            </a:r>
+            <a:r>
+              <a:rPr lang="en-US" dirty="0">
+                <a:solidFill>
+                  <a:srgbClr val="99CCFF"/>
+                </a:solidFill>
+              </a:rPr>
+              <a:t>{discount:P1}</a:t>
+            </a:r>
+            <a:r>
+              <a:rPr lang="en-US" dirty="0">
+                <a:solidFill>
+                  <a:srgbClr val="FF5050"/>
+                </a:solidFill>
+              </a:rPr>
+              <a:t>"</a:t>
+            </a:r>
+            <a:r>
+              <a:rPr lang="en-US" dirty="0">
+                <a:solidFill>
+                  <a:schemeClr val="tx1"/>
+                </a:solidFill>
+              </a:rPr>
+              <a:t>);</a:t>
+            </a:r>
+          </a:p>
+          <a:p>
+            <a:pPr>
+              <a:lnSpc>
+                <a:spcPct val="113000"/>
+              </a:lnSpc>
+            </a:pPr>
+            <a:r>
+              <a:rPr lang="en-US" dirty="0" err="1">
+                <a:solidFill>
+                  <a:srgbClr val="66FFCC"/>
+                </a:solidFill>
+              </a:rPr>
+              <a:t>Console</a:t>
+            </a:r>
+            <a:r>
+              <a:rPr lang="en-US" dirty="0" err="1">
+                <a:solidFill>
+                  <a:schemeClr val="tx1"/>
+                </a:solidFill>
+              </a:rPr>
+              <a:t>.</a:t>
+            </a:r>
+            <a:r>
+              <a:rPr lang="en-US" dirty="0" err="1">
+                <a:solidFill>
+                  <a:srgbClr val="CC9900"/>
+                </a:solidFill>
+              </a:rPr>
+              <a:t>WriteLine</a:t>
+            </a:r>
+            <a:r>
+              <a:rPr lang="en-US" dirty="0">
+                <a:solidFill>
+                  <a:schemeClr val="tx1"/>
+                </a:solidFill>
+              </a:rPr>
+              <a:t>(</a:t>
+            </a:r>
+            <a:r>
+              <a:rPr lang="en-US" dirty="0">
+                <a:solidFill>
+                  <a:srgbClr val="FF5050"/>
+                </a:solidFill>
+              </a:rPr>
+              <a:t>$"</a:t>
+            </a:r>
+            <a:r>
+              <a:rPr lang="en-US" dirty="0">
+                <a:solidFill>
+                  <a:srgbClr val="99CCFF"/>
+                </a:solidFill>
+              </a:rPr>
+              <a:t>{discount:P4}</a:t>
+            </a:r>
+            <a:r>
+              <a:rPr lang="en-US" dirty="0">
+                <a:solidFill>
+                  <a:srgbClr val="FF5050"/>
+                </a:solidFill>
+              </a:rPr>
+              <a:t>"</a:t>
+            </a:r>
+            <a:r>
+              <a:rPr lang="en-US" dirty="0">
+                <a:solidFill>
+                  <a:schemeClr val="tx1"/>
+                </a:solidFill>
+              </a:rPr>
+              <a:t>);</a:t>
+            </a:r>
+          </a:p>
+        </p:txBody>
+      </p:sp>
+      <p:sp>
+        <p:nvSpPr>
+          <p:cNvPr id="17" name="Rectangle 16">
+            <a:extLst>
+              <a:ext uri="{FF2B5EF4-FFF2-40B4-BE49-F238E27FC236}">
+                <a16:creationId xmlns:a16="http://schemas.microsoft.com/office/drawing/2014/main" id="{27579368-31F4-4D9D-A5CD-90162B5AFBB1}"/>
+              </a:ext>
+            </a:extLst>
+          </p:cNvPr>
+          <p:cNvSpPr/>
+          <p:nvPr/>
+        </p:nvSpPr>
+        <p:spPr>
+          <a:xfrm>
+            <a:off x="8273414" y="3816013"/>
+            <a:ext cx="3044197" cy="1993354"/>
+          </a:xfrm>
+          <a:prstGeom prst="rect">
+            <a:avLst/>
+          </a:prstGeom>
+          <a:solidFill>
+            <a:schemeClr val="bg1">
+              <a:lumMod val="85000"/>
+              <a:lumOff val="15000"/>
+            </a:schemeClr>
+          </a:solidFill>
+          <a:ln>
+            <a:solidFill>
+              <a:schemeClr val="bg1"/>
+            </a:solidFill>
+          </a:ln>
+        </p:spPr>
+        <p:style>
+          <a:lnRef idx="2">
+            <a:schemeClr val="accent1">
+              <a:shade val="50000"/>
+            </a:schemeClr>
+          </a:lnRef>
+          <a:fillRef idx="1">
+            <a:schemeClr val="accent1"/>
+          </a:fillRef>
+          <a:effectRef idx="0">
+            <a:schemeClr val="accent1"/>
+          </a:effectRef>
+          <a:fontRef idx="minor">
+            <a:schemeClr val="lt1"/>
+          </a:fontRef>
+        </p:style>
+        <p:txBody>
+          <a:bodyPr rtlCol="0" anchor="t"/>
+          <a:lstStyle/>
+          <a:p>
+            <a:r>
+              <a:rPr lang="en-US" dirty="0">
+                <a:latin typeface="Consolas" panose="020B0609020204030204" pitchFamily="49" charset="0"/>
+              </a:rPr>
+              <a:t>1,537,963.67</a:t>
+            </a:r>
+          </a:p>
+          <a:p>
+            <a:r>
+              <a:rPr lang="en-US" dirty="0">
+                <a:latin typeface="Consolas" panose="020B0609020204030204" pitchFamily="49" charset="0"/>
+              </a:rPr>
+              <a:t>1,537,963.666</a:t>
+            </a:r>
+          </a:p>
+          <a:p>
+            <a:r>
+              <a:rPr lang="en-US" dirty="0">
+                <a:latin typeface="Consolas" panose="020B0609020204030204" pitchFamily="49" charset="0"/>
+              </a:rPr>
+              <a:t>1,537,963.7</a:t>
+            </a:r>
+          </a:p>
+          <a:p>
+            <a:r>
+              <a:rPr lang="en-US" dirty="0">
+                <a:latin typeface="Consolas" panose="020B0609020204030204" pitchFamily="49" charset="0"/>
+              </a:rPr>
+              <a:t>13.4%</a:t>
+            </a:r>
+          </a:p>
+          <a:p>
+            <a:r>
+              <a:rPr lang="en-US" dirty="0">
+                <a:latin typeface="Consolas" panose="020B0609020204030204" pitchFamily="49" charset="0"/>
+              </a:rPr>
+              <a:t>13.3700%</a:t>
+            </a:r>
+          </a:p>
+        </p:txBody>
+      </p:sp>
+      <p:sp>
+        <p:nvSpPr>
+          <p:cNvPr id="18" name="Arrow: Right 17">
+            <a:extLst>
+              <a:ext uri="{FF2B5EF4-FFF2-40B4-BE49-F238E27FC236}">
+                <a16:creationId xmlns:a16="http://schemas.microsoft.com/office/drawing/2014/main" id="{468A764C-2AE8-4BA0-BB53-805AB3CE6EBA}"/>
+              </a:ext>
+            </a:extLst>
+          </p:cNvPr>
+          <p:cNvSpPr/>
+          <p:nvPr/>
+        </p:nvSpPr>
+        <p:spPr>
+          <a:xfrm>
+            <a:off x="7331044" y="4631151"/>
+            <a:ext cx="533400" cy="381000"/>
+          </a:xfrm>
+          <a:prstGeom prst="rightArrow">
+            <a:avLst/>
+          </a:prstGeom>
+        </p:spPr>
+        <p:style>
+          <a:lnRef idx="2">
+            <a:schemeClr val="accent1">
+              <a:shade val="50000"/>
+            </a:schemeClr>
+          </a:lnRef>
+          <a:fillRef idx="1">
+            <a:schemeClr val="accent1"/>
+          </a:fillRef>
+          <a:effectRef idx="0">
+            <a:schemeClr val="accent1"/>
+          </a:effectRef>
+          <a:fontRef idx="minor">
+            <a:schemeClr val="lt1"/>
+          </a:fontRef>
+        </p:style>
+        <p:txBody>
+          <a:bodyPr rtlCol="0" anchor="ctr"/>
+          <a:lstStyle/>
+          <a:p>
+            <a:pPr algn="ctr"/>
+            <a:endParaRPr lang="en-US"/>
+          </a:p>
+        </p:txBody>
+      </p:sp>
+    </p:spTree>
+    <p:extLst>
+      <p:ext uri="{BB962C8B-B14F-4D97-AF65-F5344CB8AC3E}">
+        <p14:creationId xmlns:p14="http://schemas.microsoft.com/office/powerpoint/2010/main" val="3592850504"/>
       </p:ext>
     </p:extLst>
   </p:cSld>
@@ -12208,6 +14794,12 @@
             <a:r>
               <a:rPr lang="en-US" dirty="0"/>
               <a:t>Displaying</a:t>
+            </a:r>
+          </a:p>
+          <a:p>
+            <a:r>
+              <a:rPr lang="en-US" dirty="0"/>
+              <a:t>Format Specifiers</a:t>
             </a:r>
           </a:p>
         </p:txBody>
@@ -15217,6 +17809,12 @@
             <a:r>
               <a:rPr lang="en-US" dirty="0"/>
               <a:t>Displaying</a:t>
+            </a:r>
+          </a:p>
+          <a:p>
+            <a:r>
+              <a:rPr lang="en-US" dirty="0"/>
+              <a:t>Format Specifiers</a:t>
             </a:r>
           </a:p>
         </p:txBody>

</xml_diff>